<commit_message>
rules update for mirror rotation
</commit_message>
<xml_diff>
--- a/images/pd_images.pptx
+++ b/images/pd_images.pptx
@@ -490,7 +490,7 @@
           <a:p>
             <a:fld id="{C1AE0D2E-781D-4ADC-9A4E-22DE016E45FF}" type="datetimeFigureOut">
               <a:rPr lang="en-US" smtClean="0"/>
-              <a:t>12/1/2018</a:t>
+              <a:t>12/2/2018</a:t>
             </a:fld>
             <a:endParaRPr lang="en-US"/>
           </a:p>
@@ -660,7 +660,7 @@
           <a:p>
             <a:fld id="{C1AE0D2E-781D-4ADC-9A4E-22DE016E45FF}" type="datetimeFigureOut">
               <a:rPr lang="en-US" smtClean="0"/>
-              <a:t>12/1/2018</a:t>
+              <a:t>12/2/2018</a:t>
             </a:fld>
             <a:endParaRPr lang="en-US"/>
           </a:p>
@@ -840,7 +840,7 @@
           <a:p>
             <a:fld id="{C1AE0D2E-781D-4ADC-9A4E-22DE016E45FF}" type="datetimeFigureOut">
               <a:rPr lang="en-US" smtClean="0"/>
-              <a:t>12/1/2018</a:t>
+              <a:t>12/2/2018</a:t>
             </a:fld>
             <a:endParaRPr lang="en-US"/>
           </a:p>
@@ -1010,7 +1010,7 @@
           <a:p>
             <a:fld id="{C1AE0D2E-781D-4ADC-9A4E-22DE016E45FF}" type="datetimeFigureOut">
               <a:rPr lang="en-US" smtClean="0"/>
-              <a:t>12/1/2018</a:t>
+              <a:t>12/2/2018</a:t>
             </a:fld>
             <a:endParaRPr lang="en-US"/>
           </a:p>
@@ -1254,7 +1254,7 @@
           <a:p>
             <a:fld id="{C1AE0D2E-781D-4ADC-9A4E-22DE016E45FF}" type="datetimeFigureOut">
               <a:rPr lang="en-US" smtClean="0"/>
-              <a:t>12/1/2018</a:t>
+              <a:t>12/2/2018</a:t>
             </a:fld>
             <a:endParaRPr lang="en-US"/>
           </a:p>
@@ -1486,7 +1486,7 @@
           <a:p>
             <a:fld id="{C1AE0D2E-781D-4ADC-9A4E-22DE016E45FF}" type="datetimeFigureOut">
               <a:rPr lang="en-US" smtClean="0"/>
-              <a:t>12/1/2018</a:t>
+              <a:t>12/2/2018</a:t>
             </a:fld>
             <a:endParaRPr lang="en-US"/>
           </a:p>
@@ -1853,7 +1853,7 @@
           <a:p>
             <a:fld id="{C1AE0D2E-781D-4ADC-9A4E-22DE016E45FF}" type="datetimeFigureOut">
               <a:rPr lang="en-US" smtClean="0"/>
-              <a:t>12/1/2018</a:t>
+              <a:t>12/2/2018</a:t>
             </a:fld>
             <a:endParaRPr lang="en-US"/>
           </a:p>
@@ -1971,7 +1971,7 @@
           <a:p>
             <a:fld id="{C1AE0D2E-781D-4ADC-9A4E-22DE016E45FF}" type="datetimeFigureOut">
               <a:rPr lang="en-US" smtClean="0"/>
-              <a:t>12/1/2018</a:t>
+              <a:t>12/2/2018</a:t>
             </a:fld>
             <a:endParaRPr lang="en-US"/>
           </a:p>
@@ -2066,7 +2066,7 @@
           <a:p>
             <a:fld id="{C1AE0D2E-781D-4ADC-9A4E-22DE016E45FF}" type="datetimeFigureOut">
               <a:rPr lang="en-US" smtClean="0"/>
-              <a:t>12/1/2018</a:t>
+              <a:t>12/2/2018</a:t>
             </a:fld>
             <a:endParaRPr lang="en-US"/>
           </a:p>
@@ -2343,7 +2343,7 @@
           <a:p>
             <a:fld id="{C1AE0D2E-781D-4ADC-9A4E-22DE016E45FF}" type="datetimeFigureOut">
               <a:rPr lang="en-US" smtClean="0"/>
-              <a:t>12/1/2018</a:t>
+              <a:t>12/2/2018</a:t>
             </a:fld>
             <a:endParaRPr lang="en-US"/>
           </a:p>
@@ -2600,7 +2600,7 @@
           <a:p>
             <a:fld id="{C1AE0D2E-781D-4ADC-9A4E-22DE016E45FF}" type="datetimeFigureOut">
               <a:rPr lang="en-US" smtClean="0"/>
-              <a:t>12/1/2018</a:t>
+              <a:t>12/2/2018</a:t>
             </a:fld>
             <a:endParaRPr lang="en-US"/>
           </a:p>
@@ -2813,7 +2813,7 @@
           <a:p>
             <a:fld id="{C1AE0D2E-781D-4ADC-9A4E-22DE016E45FF}" type="datetimeFigureOut">
               <a:rPr lang="en-US" smtClean="0"/>
-              <a:t>12/1/2018</a:t>
+              <a:t>12/2/2018</a:t>
             </a:fld>
             <a:endParaRPr lang="en-US"/>
           </a:p>
@@ -3820,11 +3820,11 @@
           <p:nvPr/>
         </p:nvGrpSpPr>
         <p:grpSpPr>
-          <a:xfrm>
-            <a:off x="6719152" y="455571"/>
-            <a:ext cx="2177210" cy="1843271"/>
+          <a:xfrm rot="2030027">
+            <a:off x="6677316" y="689854"/>
+            <a:ext cx="1981307" cy="1298850"/>
             <a:chOff x="6611289" y="298037"/>
-            <a:chExt cx="2177210" cy="1843271"/>
+            <a:chExt cx="1981307" cy="1298850"/>
           </a:xfrm>
         </p:grpSpPr>
         <p:sp>
@@ -3913,168 +3913,6 @@
             </a:p>
           </p:txBody>
         </p:sp>
-        <p:sp>
-          <p:nvSpPr>
-            <p:cNvPr id="4" name="Flowchart: Alternate Process 3">
-              <a:extLst>
-                <a:ext uri="{FF2B5EF4-FFF2-40B4-BE49-F238E27FC236}">
-                  <a16:creationId xmlns:a16="http://schemas.microsoft.com/office/drawing/2014/main" id="{1AA195D2-D9A4-41EC-83CD-142445345205}"/>
-                </a:ext>
-              </a:extLst>
-            </p:cNvPr>
-            <p:cNvSpPr/>
-            <p:nvPr/>
-          </p:nvSpPr>
-          <p:spPr>
-            <a:xfrm>
-              <a:off x="6671030" y="1491951"/>
-              <a:ext cx="705823" cy="649357"/>
-            </a:xfrm>
-            <a:prstGeom prst="flowChartAlternateProcess">
-              <a:avLst/>
-            </a:prstGeom>
-            <a:solidFill>
-              <a:schemeClr val="bg1">
-                <a:lumMod val="50000"/>
-              </a:schemeClr>
-            </a:solidFill>
-            <a:ln>
-              <a:noFill/>
-            </a:ln>
-          </p:spPr>
-          <p:style>
-            <a:lnRef idx="2">
-              <a:schemeClr val="accent1">
-                <a:shade val="50000"/>
-              </a:schemeClr>
-            </a:lnRef>
-            <a:fillRef idx="1">
-              <a:schemeClr val="accent1"/>
-            </a:fillRef>
-            <a:effectRef idx="0">
-              <a:schemeClr val="accent1"/>
-            </a:effectRef>
-            <a:fontRef idx="minor">
-              <a:schemeClr val="lt1"/>
-            </a:fontRef>
-          </p:style>
-          <p:txBody>
-            <a:bodyPr rtlCol="0" anchor="ctr"/>
-            <a:lstStyle/>
-            <a:p>
-              <a:pPr algn="ctr"/>
-              <a:endParaRPr lang="en-US"/>
-            </a:p>
-          </p:txBody>
-        </p:sp>
-        <p:sp>
-          <p:nvSpPr>
-            <p:cNvPr id="6" name="Flowchart: Alternate Process 5">
-              <a:extLst>
-                <a:ext uri="{FF2B5EF4-FFF2-40B4-BE49-F238E27FC236}">
-                  <a16:creationId xmlns:a16="http://schemas.microsoft.com/office/drawing/2014/main" id="{C7B533F3-B768-4F23-941E-737E105668C1}"/>
-                </a:ext>
-              </a:extLst>
-            </p:cNvPr>
-            <p:cNvSpPr/>
-            <p:nvPr/>
-          </p:nvSpPr>
-          <p:spPr>
-            <a:xfrm>
-              <a:off x="7376853" y="1491950"/>
-              <a:ext cx="705823" cy="649357"/>
-            </a:xfrm>
-            <a:prstGeom prst="flowChartAlternateProcess">
-              <a:avLst/>
-            </a:prstGeom>
-            <a:solidFill>
-              <a:schemeClr val="bg1">
-                <a:lumMod val="50000"/>
-              </a:schemeClr>
-            </a:solidFill>
-            <a:ln>
-              <a:noFill/>
-            </a:ln>
-          </p:spPr>
-          <p:style>
-            <a:lnRef idx="2">
-              <a:schemeClr val="accent1">
-                <a:shade val="50000"/>
-              </a:schemeClr>
-            </a:lnRef>
-            <a:fillRef idx="1">
-              <a:schemeClr val="accent1"/>
-            </a:fillRef>
-            <a:effectRef idx="0">
-              <a:schemeClr val="accent1"/>
-            </a:effectRef>
-            <a:fontRef idx="minor">
-              <a:schemeClr val="lt1"/>
-            </a:fontRef>
-          </p:style>
-          <p:txBody>
-            <a:bodyPr rtlCol="0" anchor="ctr"/>
-            <a:lstStyle/>
-            <a:p>
-              <a:pPr algn="ctr"/>
-              <a:endParaRPr lang="en-US"/>
-            </a:p>
-          </p:txBody>
-        </p:sp>
-        <p:sp>
-          <p:nvSpPr>
-            <p:cNvPr id="7" name="Flowchart: Alternate Process 6">
-              <a:extLst>
-                <a:ext uri="{FF2B5EF4-FFF2-40B4-BE49-F238E27FC236}">
-                  <a16:creationId xmlns:a16="http://schemas.microsoft.com/office/drawing/2014/main" id="{ADF56DA3-4438-403C-A0BC-E9EC224EA624}"/>
-                </a:ext>
-              </a:extLst>
-            </p:cNvPr>
-            <p:cNvSpPr/>
-            <p:nvPr/>
-          </p:nvSpPr>
-          <p:spPr>
-            <a:xfrm>
-              <a:off x="8082676" y="1491949"/>
-              <a:ext cx="705823" cy="649357"/>
-            </a:xfrm>
-            <a:prstGeom prst="flowChartAlternateProcess">
-              <a:avLst/>
-            </a:prstGeom>
-            <a:solidFill>
-              <a:schemeClr val="bg1">
-                <a:lumMod val="50000"/>
-              </a:schemeClr>
-            </a:solidFill>
-            <a:ln>
-              <a:noFill/>
-            </a:ln>
-          </p:spPr>
-          <p:style>
-            <a:lnRef idx="2">
-              <a:schemeClr val="accent1">
-                <a:shade val="50000"/>
-              </a:schemeClr>
-            </a:lnRef>
-            <a:fillRef idx="1">
-              <a:schemeClr val="accent1"/>
-            </a:fillRef>
-            <a:effectRef idx="0">
-              <a:schemeClr val="accent1"/>
-            </a:effectRef>
-            <a:fontRef idx="minor">
-              <a:schemeClr val="lt1"/>
-            </a:fontRef>
-          </p:style>
-          <p:txBody>
-            <a:bodyPr rtlCol="0" anchor="ctr"/>
-            <a:lstStyle/>
-            <a:p>
-              <a:pPr algn="ctr"/>
-              <a:endParaRPr lang="en-US"/>
-            </a:p>
-          </p:txBody>
-        </p:sp>
         <p:cxnSp>
           <p:nvCxnSpPr>
             <p:cNvPr id="12" name="Straight Connector 11">
@@ -4333,10 +4171,10 @@
       </p:sp>
       <p:grpSp>
         <p:nvGrpSpPr>
-          <p:cNvPr id="42" name="Group 41">
+          <p:cNvPr id="3" name="Group 2">
             <a:extLst>
               <a:ext uri="{FF2B5EF4-FFF2-40B4-BE49-F238E27FC236}">
-                <a16:creationId xmlns:a16="http://schemas.microsoft.com/office/drawing/2014/main" id="{335345F2-2701-4092-A3D4-E418B4F7CDE2}"/>
+                <a16:creationId xmlns:a16="http://schemas.microsoft.com/office/drawing/2014/main" id="{884AA043-2868-4513-A6B5-909F3F6DF2F7}"/>
               </a:ext>
             </a:extLst>
           </p:cNvPr>
@@ -4345,18 +4183,301 @@
         </p:nvGrpSpPr>
         <p:grpSpPr>
           <a:xfrm>
-            <a:off x="804252" y="3156356"/>
-            <a:ext cx="7582511" cy="949574"/>
-            <a:chOff x="804251" y="3523812"/>
-            <a:chExt cx="7582511" cy="949574"/>
+            <a:off x="804252" y="3351648"/>
+            <a:ext cx="486030" cy="558990"/>
+            <a:chOff x="1551702" y="3690492"/>
+            <a:chExt cx="486030" cy="558990"/>
+          </a:xfrm>
+        </p:grpSpPr>
+        <p:sp>
+          <p:nvSpPr>
+            <p:cNvPr id="32" name="Rectangle: Rounded Corners 31">
+              <a:extLst>
+                <a:ext uri="{FF2B5EF4-FFF2-40B4-BE49-F238E27FC236}">
+                  <a16:creationId xmlns:a16="http://schemas.microsoft.com/office/drawing/2014/main" id="{2CD343D9-D128-41EC-868E-DD47E31C8AA1}"/>
+                </a:ext>
+              </a:extLst>
+            </p:cNvPr>
+            <p:cNvSpPr/>
+            <p:nvPr/>
+          </p:nvSpPr>
+          <p:spPr>
+            <a:xfrm>
+              <a:off x="1577753" y="3690492"/>
+              <a:ext cx="443552" cy="553998"/>
+            </a:xfrm>
+            <a:prstGeom prst="roundRect">
+              <a:avLst/>
+            </a:prstGeom>
+            <a:solidFill>
+              <a:srgbClr val="FFC000"/>
+            </a:solidFill>
+            <a:ln w="38100">
+              <a:solidFill>
+                <a:schemeClr val="tx1"/>
+              </a:solidFill>
+            </a:ln>
+          </p:spPr>
+          <p:style>
+            <a:lnRef idx="2">
+              <a:schemeClr val="accent1">
+                <a:shade val="50000"/>
+              </a:schemeClr>
+            </a:lnRef>
+            <a:fillRef idx="1">
+              <a:schemeClr val="accent1"/>
+            </a:fillRef>
+            <a:effectRef idx="0">
+              <a:schemeClr val="accent1"/>
+            </a:effectRef>
+            <a:fontRef idx="minor">
+              <a:schemeClr val="lt1"/>
+            </a:fontRef>
+          </p:style>
+          <p:txBody>
+            <a:bodyPr rtlCol="0" anchor="ctr"/>
+            <a:lstStyle/>
+            <a:p>
+              <a:pPr algn="ctr"/>
+              <a:endParaRPr lang="en-US"/>
+            </a:p>
+          </p:txBody>
+        </p:sp>
+        <p:sp>
+          <p:nvSpPr>
+            <p:cNvPr id="33" name="Rectangle 32">
+              <a:extLst>
+                <a:ext uri="{FF2B5EF4-FFF2-40B4-BE49-F238E27FC236}">
+                  <a16:creationId xmlns:a16="http://schemas.microsoft.com/office/drawing/2014/main" id="{414D774A-3F5A-4E14-A7D3-3383FECBFD00}"/>
+                </a:ext>
+              </a:extLst>
+            </p:cNvPr>
+            <p:cNvSpPr/>
+            <p:nvPr/>
+          </p:nvSpPr>
+          <p:spPr>
+            <a:xfrm>
+              <a:off x="1551702" y="3695484"/>
+              <a:ext cx="486030" cy="553998"/>
+            </a:xfrm>
+            <a:prstGeom prst="rect">
+              <a:avLst/>
+            </a:prstGeom>
+            <a:noFill/>
+          </p:spPr>
+          <p:txBody>
+            <a:bodyPr wrap="none" lIns="91440" tIns="45720" rIns="91440" bIns="45720">
+              <a:spAutoFit/>
+            </a:bodyPr>
+            <a:lstStyle/>
+            <a:p>
+              <a:pPr algn="ctr"/>
+              <a:r>
+                <a:rPr lang="en-US" sz="3000" b="1" cap="none" spc="50" dirty="0">
+                  <a:ln w="9525" cmpd="sng">
+                    <a:solidFill>
+                      <a:schemeClr val="tx1"/>
+                    </a:solidFill>
+                    <a:prstDash val="solid"/>
+                  </a:ln>
+                  <a:solidFill>
+                    <a:srgbClr val="70AD47">
+                      <a:tint val="1000"/>
+                    </a:srgbClr>
+                  </a:solidFill>
+                  <a:effectLst>
+                    <a:glow rad="38100">
+                      <a:schemeClr val="accent1">
+                        <a:alpha val="40000"/>
+                      </a:schemeClr>
+                    </a:glow>
+                  </a:effectLst>
+                  <a:latin typeface="Abadi" panose="020B0604020104020204" pitchFamily="34" charset="0"/>
+                </a:rPr>
+                <a:t>M</a:t>
+              </a:r>
+            </a:p>
+          </p:txBody>
+        </p:sp>
+      </p:grpSp>
+      <p:grpSp>
+        <p:nvGrpSpPr>
+          <p:cNvPr id="34" name="Group 33">
+            <a:extLst>
+              <a:ext uri="{FF2B5EF4-FFF2-40B4-BE49-F238E27FC236}">
+                <a16:creationId xmlns:a16="http://schemas.microsoft.com/office/drawing/2014/main" id="{097B13E2-8C58-431D-A7B1-77313781308A}"/>
+              </a:ext>
+            </a:extLst>
+          </p:cNvPr>
+          <p:cNvGrpSpPr/>
+          <p:nvPr/>
+        </p:nvGrpSpPr>
+        <p:grpSpPr>
+          <a:xfrm>
+            <a:off x="7122952" y="3349948"/>
+            <a:ext cx="1804093" cy="558990"/>
+            <a:chOff x="2863959" y="5152341"/>
+            <a:chExt cx="1804093" cy="558990"/>
+          </a:xfrm>
+        </p:grpSpPr>
+        <p:sp>
+          <p:nvSpPr>
+            <p:cNvPr id="35" name="Rectangle: Rounded Corners 34">
+              <a:extLst>
+                <a:ext uri="{FF2B5EF4-FFF2-40B4-BE49-F238E27FC236}">
+                  <a16:creationId xmlns:a16="http://schemas.microsoft.com/office/drawing/2014/main" id="{A44CBF18-972C-4610-B0FF-EB0FE95426E0}"/>
+                </a:ext>
+              </a:extLst>
+            </p:cNvPr>
+            <p:cNvSpPr/>
+            <p:nvPr/>
+          </p:nvSpPr>
+          <p:spPr>
+            <a:xfrm>
+              <a:off x="2863959" y="5152341"/>
+              <a:ext cx="1804093" cy="553998"/>
+            </a:xfrm>
+            <a:prstGeom prst="roundRect">
+              <a:avLst/>
+            </a:prstGeom>
+            <a:solidFill>
+              <a:srgbClr val="00FFFF"/>
+            </a:solidFill>
+            <a:ln w="38100">
+              <a:solidFill>
+                <a:schemeClr val="tx1"/>
+              </a:solidFill>
+            </a:ln>
+          </p:spPr>
+          <p:style>
+            <a:lnRef idx="2">
+              <a:schemeClr val="accent1">
+                <a:shade val="50000"/>
+              </a:schemeClr>
+            </a:lnRef>
+            <a:fillRef idx="1">
+              <a:schemeClr val="accent1"/>
+            </a:fillRef>
+            <a:effectRef idx="0">
+              <a:schemeClr val="accent1"/>
+            </a:effectRef>
+            <a:fontRef idx="minor">
+              <a:schemeClr val="lt1"/>
+            </a:fontRef>
+          </p:style>
+          <p:txBody>
+            <a:bodyPr rtlCol="0" anchor="ctr"/>
+            <a:lstStyle/>
+            <a:p>
+              <a:pPr algn="ctr"/>
+              <a:endParaRPr lang="en-US" sz="3000"/>
+            </a:p>
+          </p:txBody>
+        </p:sp>
+        <p:sp>
+          <p:nvSpPr>
+            <p:cNvPr id="36" name="Rectangle 35">
+              <a:extLst>
+                <a:ext uri="{FF2B5EF4-FFF2-40B4-BE49-F238E27FC236}">
+                  <a16:creationId xmlns:a16="http://schemas.microsoft.com/office/drawing/2014/main" id="{D849C677-12D5-4082-9F9E-8236345DED55}"/>
+                </a:ext>
+              </a:extLst>
+            </p:cNvPr>
+            <p:cNvSpPr/>
+            <p:nvPr/>
+          </p:nvSpPr>
+          <p:spPr>
+            <a:xfrm>
+              <a:off x="2863959" y="5157333"/>
+              <a:ext cx="1804093" cy="553998"/>
+            </a:xfrm>
+            <a:prstGeom prst="rect">
+              <a:avLst/>
+            </a:prstGeom>
+            <a:noFill/>
+          </p:spPr>
+          <p:txBody>
+            <a:bodyPr wrap="square" lIns="91440" tIns="45720" rIns="91440" bIns="45720">
+              <a:spAutoFit/>
+            </a:bodyPr>
+            <a:lstStyle/>
+            <a:p>
+              <a:pPr algn="ctr"/>
+              <a:r>
+                <a:rPr lang="en-US" sz="3000" b="1" spc="50" dirty="0">
+                  <a:ln w="9525" cmpd="sng">
+                    <a:solidFill>
+                      <a:schemeClr val="tx1"/>
+                    </a:solidFill>
+                    <a:prstDash val="solid"/>
+                  </a:ln>
+                  <a:solidFill>
+                    <a:srgbClr val="70AD47">
+                      <a:tint val="1000"/>
+                    </a:srgbClr>
+                  </a:solidFill>
+                  <a:effectLst>
+                    <a:glow rad="38100">
+                      <a:schemeClr val="accent1">
+                        <a:alpha val="40000"/>
+                      </a:schemeClr>
+                    </a:glow>
+                  </a:effectLst>
+                  <a:latin typeface="Abadi" panose="020B0604020104020204" pitchFamily="34" charset="0"/>
+                </a:rPr>
+                <a:t>SPACE</a:t>
+              </a:r>
+              <a:endParaRPr lang="en-US" sz="3000" b="1" cap="none" spc="50" dirty="0">
+                <a:ln w="9525" cmpd="sng">
+                  <a:solidFill>
+                    <a:schemeClr val="tx1"/>
+                  </a:solidFill>
+                  <a:prstDash val="solid"/>
+                </a:ln>
+                <a:solidFill>
+                  <a:srgbClr val="70AD47">
+                    <a:tint val="1000"/>
+                  </a:srgbClr>
+                </a:solidFill>
+                <a:effectLst>
+                  <a:glow rad="38100">
+                    <a:schemeClr val="accent1">
+                      <a:alpha val="40000"/>
+                    </a:schemeClr>
+                  </a:glow>
+                </a:effectLst>
+                <a:latin typeface="Abadi" panose="020B0604020104020204" pitchFamily="34" charset="0"/>
+              </a:endParaRPr>
+            </a:p>
+          </p:txBody>
+        </p:sp>
+      </p:grpSp>
+      <p:grpSp>
+        <p:nvGrpSpPr>
+          <p:cNvPr id="10" name="Group 9">
+            <a:extLst>
+              <a:ext uri="{FF2B5EF4-FFF2-40B4-BE49-F238E27FC236}">
+                <a16:creationId xmlns:a16="http://schemas.microsoft.com/office/drawing/2014/main" id="{5D94C24B-0E42-4528-A2AF-E854D7D4FB5C}"/>
+              </a:ext>
+            </a:extLst>
+          </p:cNvPr>
+          <p:cNvGrpSpPr/>
+          <p:nvPr/>
+        </p:nvGrpSpPr>
+        <p:grpSpPr>
+          <a:xfrm>
+            <a:off x="2853083" y="3156356"/>
+            <a:ext cx="2166788" cy="949574"/>
+            <a:chOff x="2727008" y="3508212"/>
+            <a:chExt cx="2166788" cy="949574"/>
           </a:xfrm>
         </p:grpSpPr>
         <p:grpSp>
           <p:nvGrpSpPr>
-            <p:cNvPr id="3" name="Group 2">
+            <p:cNvPr id="20" name="Group 19">
               <a:extLst>
                 <a:ext uri="{FF2B5EF4-FFF2-40B4-BE49-F238E27FC236}">
-                  <a16:creationId xmlns:a16="http://schemas.microsoft.com/office/drawing/2014/main" id="{884AA043-2868-4513-A6B5-909F3F6DF2F7}"/>
+                  <a16:creationId xmlns:a16="http://schemas.microsoft.com/office/drawing/2014/main" id="{BC0F53DC-E96D-4A11-AB04-7694577B0679}"/>
                 </a:ext>
               </a:extLst>
             </p:cNvPr>
@@ -4365,18 +4486,18 @@
           </p:nvGrpSpPr>
           <p:grpSpPr>
             <a:xfrm>
-              <a:off x="804251" y="3719104"/>
-              <a:ext cx="486030" cy="558990"/>
-              <a:chOff x="1551702" y="3690492"/>
-              <a:chExt cx="486030" cy="558990"/>
+              <a:off x="2727008" y="3508212"/>
+              <a:ext cx="2166788" cy="949574"/>
+              <a:chOff x="3416490" y="2183642"/>
+              <a:chExt cx="1526274" cy="668875"/>
             </a:xfrm>
           </p:grpSpPr>
           <p:sp>
             <p:nvSpPr>
-              <p:cNvPr id="32" name="Rectangle: Rounded Corners 31">
+              <p:cNvPr id="24" name="Rectangle: Rounded Corners 23">
                 <a:extLst>
                   <a:ext uri="{FF2B5EF4-FFF2-40B4-BE49-F238E27FC236}">
-                    <a16:creationId xmlns:a16="http://schemas.microsoft.com/office/drawing/2014/main" id="{2CD343D9-D128-41EC-868E-DD47E31C8AA1}"/>
+                    <a16:creationId xmlns:a16="http://schemas.microsoft.com/office/drawing/2014/main" id="{7CE0C215-058F-45F7-9FAD-DC55E862DC31}"/>
                   </a:ext>
                 </a:extLst>
               </p:cNvPr>
@@ -4385,8 +4506,8 @@
             </p:nvSpPr>
             <p:spPr>
               <a:xfrm>
-                <a:off x="1577753" y="3690492"/>
-                <a:ext cx="443552" cy="553998"/>
+                <a:off x="3957851" y="2183642"/>
+                <a:ext cx="443552" cy="300251"/>
               </a:xfrm>
               <a:prstGeom prst="roundRect">
                 <a:avLst/>
@@ -4394,138 +4515,7 @@
               <a:solidFill>
                 <a:srgbClr val="FFC000"/>
               </a:solidFill>
-              <a:ln w="38100">
-                <a:solidFill>
-                  <a:schemeClr val="tx1"/>
-                </a:solidFill>
-              </a:ln>
-            </p:spPr>
-            <p:style>
-              <a:lnRef idx="2">
-                <a:schemeClr val="accent1">
-                  <a:shade val="50000"/>
-                </a:schemeClr>
-              </a:lnRef>
-              <a:fillRef idx="1">
-                <a:schemeClr val="accent1"/>
-              </a:fillRef>
-              <a:effectRef idx="0">
-                <a:schemeClr val="accent1"/>
-              </a:effectRef>
-              <a:fontRef idx="minor">
-                <a:schemeClr val="lt1"/>
-              </a:fontRef>
-            </p:style>
-            <p:txBody>
-              <a:bodyPr rtlCol="0" anchor="ctr"/>
-              <a:lstStyle/>
-              <a:p>
-                <a:pPr algn="ctr"/>
-                <a:endParaRPr lang="en-US"/>
-              </a:p>
-            </p:txBody>
-          </p:sp>
-          <p:sp>
-            <p:nvSpPr>
-              <p:cNvPr id="33" name="Rectangle 32">
-                <a:extLst>
-                  <a:ext uri="{FF2B5EF4-FFF2-40B4-BE49-F238E27FC236}">
-                    <a16:creationId xmlns:a16="http://schemas.microsoft.com/office/drawing/2014/main" id="{414D774A-3F5A-4E14-A7D3-3383FECBFD00}"/>
-                  </a:ext>
-                </a:extLst>
-              </p:cNvPr>
-              <p:cNvSpPr/>
-              <p:nvPr/>
-            </p:nvSpPr>
-            <p:spPr>
-              <a:xfrm>
-                <a:off x="1551702" y="3695484"/>
-                <a:ext cx="486030" cy="553998"/>
-              </a:xfrm>
-              <a:prstGeom prst="rect">
-                <a:avLst/>
-              </a:prstGeom>
-              <a:noFill/>
-            </p:spPr>
-            <p:txBody>
-              <a:bodyPr wrap="none" lIns="91440" tIns="45720" rIns="91440" bIns="45720">
-                <a:spAutoFit/>
-              </a:bodyPr>
-              <a:lstStyle/>
-              <a:p>
-                <a:pPr algn="ctr"/>
-                <a:r>
-                  <a:rPr lang="en-US" sz="3000" b="1" cap="none" spc="50" dirty="0">
-                    <a:ln w="9525" cmpd="sng">
-                      <a:solidFill>
-                        <a:schemeClr val="tx1"/>
-                      </a:solidFill>
-                      <a:prstDash val="solid"/>
-                    </a:ln>
-                    <a:solidFill>
-                      <a:srgbClr val="70AD47">
-                        <a:tint val="1000"/>
-                      </a:srgbClr>
-                    </a:solidFill>
-                    <a:effectLst>
-                      <a:glow rad="38100">
-                        <a:schemeClr val="accent1">
-                          <a:alpha val="40000"/>
-                        </a:schemeClr>
-                      </a:glow>
-                    </a:effectLst>
-                    <a:latin typeface="Abadi" panose="020B0604020104020204" pitchFamily="34" charset="0"/>
-                  </a:rPr>
-                  <a:t>M</a:t>
-                </a:r>
-              </a:p>
-            </p:txBody>
-          </p:sp>
-        </p:grpSp>
-        <p:grpSp>
-          <p:nvGrpSpPr>
-            <p:cNvPr id="34" name="Group 33">
-              <a:extLst>
-                <a:ext uri="{FF2B5EF4-FFF2-40B4-BE49-F238E27FC236}">
-                  <a16:creationId xmlns:a16="http://schemas.microsoft.com/office/drawing/2014/main" id="{097B13E2-8C58-431D-A7B1-77313781308A}"/>
-                </a:ext>
-              </a:extLst>
-            </p:cNvPr>
-            <p:cNvGrpSpPr/>
-            <p:nvPr/>
-          </p:nvGrpSpPr>
-          <p:grpSpPr>
-            <a:xfrm>
-              <a:off x="6582669" y="3719104"/>
-              <a:ext cx="1804093" cy="558990"/>
-              <a:chOff x="2863959" y="5152341"/>
-              <a:chExt cx="1804093" cy="558990"/>
-            </a:xfrm>
-          </p:grpSpPr>
-          <p:sp>
-            <p:nvSpPr>
-              <p:cNvPr id="35" name="Rectangle: Rounded Corners 34">
-                <a:extLst>
-                  <a:ext uri="{FF2B5EF4-FFF2-40B4-BE49-F238E27FC236}">
-                    <a16:creationId xmlns:a16="http://schemas.microsoft.com/office/drawing/2014/main" id="{A44CBF18-972C-4610-B0FF-EB0FE95426E0}"/>
-                  </a:ext>
-                </a:extLst>
-              </p:cNvPr>
-              <p:cNvSpPr/>
-              <p:nvPr/>
-            </p:nvSpPr>
-            <p:spPr>
-              <a:xfrm>
-                <a:off x="2863959" y="5152341"/>
-                <a:ext cx="1804093" cy="553998"/>
-              </a:xfrm>
-              <a:prstGeom prst="roundRect">
-                <a:avLst/>
-              </a:prstGeom>
-              <a:solidFill>
-                <a:srgbClr val="00FFFF"/>
-              </a:solidFill>
-              <a:ln w="38100">
+              <a:ln w="28575">
                 <a:solidFill>
                   <a:schemeClr val="tx1"/>
                 </a:solidFill>
@@ -4558,10 +4548,10 @@
           </p:sp>
           <p:sp>
             <p:nvSpPr>
-              <p:cNvPr id="36" name="Rectangle 35">
+              <p:cNvPr id="25" name="Rectangle: Rounded Corners 24">
                 <a:extLst>
                   <a:ext uri="{FF2B5EF4-FFF2-40B4-BE49-F238E27FC236}">
-                    <a16:creationId xmlns:a16="http://schemas.microsoft.com/office/drawing/2014/main" id="{D849C677-12D5-4082-9F9E-8236345DED55}"/>
+                    <a16:creationId xmlns:a16="http://schemas.microsoft.com/office/drawing/2014/main" id="{7158B2E8-F40A-4502-868C-7E4CAEA09E9E}"/>
                   </a:ext>
                 </a:extLst>
               </p:cNvPr>
@@ -4570,351 +4560,16 @@
             </p:nvSpPr>
             <p:spPr>
               <a:xfrm>
-                <a:off x="2863959" y="5157333"/>
-                <a:ext cx="1804093" cy="553998"/>
+                <a:off x="3957851" y="2552266"/>
+                <a:ext cx="443552" cy="300251"/>
               </a:xfrm>
-              <a:prstGeom prst="rect">
-                <a:avLst/>
-              </a:prstGeom>
-              <a:noFill/>
-            </p:spPr>
-            <p:txBody>
-              <a:bodyPr wrap="square" lIns="91440" tIns="45720" rIns="91440" bIns="45720">
-                <a:spAutoFit/>
-              </a:bodyPr>
-              <a:lstStyle/>
-              <a:p>
-                <a:pPr algn="ctr"/>
-                <a:r>
-                  <a:rPr lang="en-US" sz="3000" b="1" spc="50" dirty="0">
-                    <a:ln w="9525" cmpd="sng">
-                      <a:solidFill>
-                        <a:schemeClr val="tx1"/>
-                      </a:solidFill>
-                      <a:prstDash val="solid"/>
-                    </a:ln>
-                    <a:solidFill>
-                      <a:srgbClr val="70AD47">
-                        <a:tint val="1000"/>
-                      </a:srgbClr>
-                    </a:solidFill>
-                    <a:effectLst>
-                      <a:glow rad="38100">
-                        <a:schemeClr val="accent1">
-                          <a:alpha val="40000"/>
-                        </a:schemeClr>
-                      </a:glow>
-                    </a:effectLst>
-                    <a:latin typeface="Abadi" panose="020B0604020104020204" pitchFamily="34" charset="0"/>
-                  </a:rPr>
-                  <a:t>SPACE</a:t>
-                </a:r>
-                <a:endParaRPr lang="en-US" sz="3000" b="1" cap="none" spc="50" dirty="0">
-                  <a:ln w="9525" cmpd="sng">
-                    <a:solidFill>
-                      <a:schemeClr val="tx1"/>
-                    </a:solidFill>
-                    <a:prstDash val="solid"/>
-                  </a:ln>
-                  <a:solidFill>
-                    <a:srgbClr val="70AD47">
-                      <a:tint val="1000"/>
-                    </a:srgbClr>
-                  </a:solidFill>
-                  <a:effectLst>
-                    <a:glow rad="38100">
-                      <a:schemeClr val="accent1">
-                        <a:alpha val="40000"/>
-                      </a:schemeClr>
-                    </a:glow>
-                  </a:effectLst>
-                  <a:latin typeface="Abadi" panose="020B0604020104020204" pitchFamily="34" charset="0"/>
-                </a:endParaRPr>
-              </a:p>
-            </p:txBody>
-          </p:sp>
-        </p:grpSp>
-        <p:grpSp>
-          <p:nvGrpSpPr>
-            <p:cNvPr id="10" name="Group 9">
-              <a:extLst>
-                <a:ext uri="{FF2B5EF4-FFF2-40B4-BE49-F238E27FC236}">
-                  <a16:creationId xmlns:a16="http://schemas.microsoft.com/office/drawing/2014/main" id="{5D94C24B-0E42-4528-A2AF-E854D7D4FB5C}"/>
-                </a:ext>
-              </a:extLst>
-            </p:cNvPr>
-            <p:cNvGrpSpPr/>
-            <p:nvPr/>
-          </p:nvGrpSpPr>
-          <p:grpSpPr>
-            <a:xfrm>
-              <a:off x="2853082" y="3523812"/>
-              <a:ext cx="2166788" cy="949574"/>
-              <a:chOff x="2727008" y="3508212"/>
-              <a:chExt cx="2166788" cy="949574"/>
-            </a:xfrm>
-          </p:grpSpPr>
-          <p:grpSp>
-            <p:nvGrpSpPr>
-              <p:cNvPr id="20" name="Group 19">
-                <a:extLst>
-                  <a:ext uri="{FF2B5EF4-FFF2-40B4-BE49-F238E27FC236}">
-                    <a16:creationId xmlns:a16="http://schemas.microsoft.com/office/drawing/2014/main" id="{BC0F53DC-E96D-4A11-AB04-7694577B0679}"/>
-                  </a:ext>
-                </a:extLst>
-              </p:cNvPr>
-              <p:cNvGrpSpPr/>
-              <p:nvPr/>
-            </p:nvGrpSpPr>
-            <p:grpSpPr>
-              <a:xfrm>
-                <a:off x="2727008" y="3508212"/>
-                <a:ext cx="2166788" cy="949574"/>
-                <a:chOff x="3416490" y="2183642"/>
-                <a:chExt cx="1526274" cy="668875"/>
-              </a:xfrm>
-            </p:grpSpPr>
-            <p:sp>
-              <p:nvSpPr>
-                <p:cNvPr id="24" name="Rectangle: Rounded Corners 23">
-                  <a:extLst>
-                    <a:ext uri="{FF2B5EF4-FFF2-40B4-BE49-F238E27FC236}">
-                      <a16:creationId xmlns:a16="http://schemas.microsoft.com/office/drawing/2014/main" id="{7CE0C215-058F-45F7-9FAD-DC55E862DC31}"/>
-                    </a:ext>
-                  </a:extLst>
-                </p:cNvPr>
-                <p:cNvSpPr/>
-                <p:nvPr/>
-              </p:nvSpPr>
-              <p:spPr>
-                <a:xfrm>
-                  <a:off x="3957851" y="2183642"/>
-                  <a:ext cx="443552" cy="300251"/>
-                </a:xfrm>
-                <a:prstGeom prst="roundRect">
-                  <a:avLst/>
-                </a:prstGeom>
-                <a:solidFill>
-                  <a:srgbClr val="FFC000"/>
-                </a:solidFill>
-                <a:ln w="28575">
-                  <a:solidFill>
-                    <a:schemeClr val="tx1"/>
-                  </a:solidFill>
-                </a:ln>
-              </p:spPr>
-              <p:style>
-                <a:lnRef idx="2">
-                  <a:schemeClr val="accent1">
-                    <a:shade val="50000"/>
-                  </a:schemeClr>
-                </a:lnRef>
-                <a:fillRef idx="1">
-                  <a:schemeClr val="accent1"/>
-                </a:fillRef>
-                <a:effectRef idx="0">
-                  <a:schemeClr val="accent1"/>
-                </a:effectRef>
-                <a:fontRef idx="minor">
-                  <a:schemeClr val="lt1"/>
-                </a:fontRef>
-              </p:style>
-              <p:txBody>
-                <a:bodyPr rtlCol="0" anchor="ctr"/>
-                <a:lstStyle/>
-                <a:p>
-                  <a:pPr algn="ctr"/>
-                  <a:endParaRPr lang="en-US" sz="3000"/>
-                </a:p>
-              </p:txBody>
-            </p:sp>
-            <p:sp>
-              <p:nvSpPr>
-                <p:cNvPr id="25" name="Rectangle: Rounded Corners 24">
-                  <a:extLst>
-                    <a:ext uri="{FF2B5EF4-FFF2-40B4-BE49-F238E27FC236}">
-                      <a16:creationId xmlns:a16="http://schemas.microsoft.com/office/drawing/2014/main" id="{7158B2E8-F40A-4502-868C-7E4CAEA09E9E}"/>
-                    </a:ext>
-                  </a:extLst>
-                </p:cNvPr>
-                <p:cNvSpPr/>
-                <p:nvPr/>
-              </p:nvSpPr>
-              <p:spPr>
-                <a:xfrm>
-                  <a:off x="3957851" y="2552266"/>
-                  <a:ext cx="443552" cy="300251"/>
-                </a:xfrm>
-                <a:prstGeom prst="roundRect">
-                  <a:avLst/>
-                </a:prstGeom>
-                <a:solidFill>
-                  <a:srgbClr val="FFC000"/>
-                </a:solidFill>
-                <a:ln w="28575">
-                  <a:solidFill>
-                    <a:schemeClr val="tx1"/>
-                  </a:solidFill>
-                </a:ln>
-              </p:spPr>
-              <p:style>
-                <a:lnRef idx="2">
-                  <a:schemeClr val="accent1">
-                    <a:shade val="50000"/>
-                  </a:schemeClr>
-                </a:lnRef>
-                <a:fillRef idx="1">
-                  <a:schemeClr val="accent1"/>
-                </a:fillRef>
-                <a:effectRef idx="0">
-                  <a:schemeClr val="accent1"/>
-                </a:effectRef>
-                <a:fontRef idx="minor">
-                  <a:schemeClr val="lt1"/>
-                </a:fontRef>
-              </p:style>
-              <p:txBody>
-                <a:bodyPr rtlCol="0" anchor="ctr"/>
-                <a:lstStyle/>
-                <a:p>
-                  <a:pPr algn="ctr"/>
-                  <a:endParaRPr lang="en-US" sz="3000" dirty="0"/>
-                </a:p>
-              </p:txBody>
-            </p:sp>
-            <p:sp>
-              <p:nvSpPr>
-                <p:cNvPr id="26" name="Rectangle: Rounded Corners 25">
-                  <a:extLst>
-                    <a:ext uri="{FF2B5EF4-FFF2-40B4-BE49-F238E27FC236}">
-                      <a16:creationId xmlns:a16="http://schemas.microsoft.com/office/drawing/2014/main" id="{B10B9B8D-8963-4791-89FD-272106D8095E}"/>
-                    </a:ext>
-                  </a:extLst>
-                </p:cNvPr>
-                <p:cNvSpPr/>
-                <p:nvPr/>
-              </p:nvSpPr>
-              <p:spPr>
-                <a:xfrm>
-                  <a:off x="3416490" y="2552266"/>
-                  <a:ext cx="443552" cy="300251"/>
-                </a:xfrm>
-                <a:prstGeom prst="roundRect">
-                  <a:avLst/>
-                </a:prstGeom>
-                <a:solidFill>
-                  <a:srgbClr val="FFC000"/>
-                </a:solidFill>
-                <a:ln w="28575">
-                  <a:solidFill>
-                    <a:schemeClr val="tx1"/>
-                  </a:solidFill>
-                  <a:headEnd type="none" w="med" len="med"/>
-                  <a:tailEnd type="none" w="med" len="med"/>
-                </a:ln>
-              </p:spPr>
-              <p:style>
-                <a:lnRef idx="2">
-                  <a:schemeClr val="accent1"/>
-                </a:lnRef>
-                <a:fillRef idx="1">
-                  <a:schemeClr val="lt1"/>
-                </a:fillRef>
-                <a:effectRef idx="0">
-                  <a:schemeClr val="accent1"/>
-                </a:effectRef>
-                <a:fontRef idx="minor">
-                  <a:schemeClr val="dk1"/>
-                </a:fontRef>
-              </p:style>
-              <p:txBody>
-                <a:bodyPr rtlCol="0" anchor="ctr"/>
-                <a:lstStyle/>
-                <a:p>
-                  <a:pPr algn="ctr"/>
-                  <a:endParaRPr lang="en-US" sz="3000"/>
-                </a:p>
-              </p:txBody>
-            </p:sp>
-            <p:sp>
-              <p:nvSpPr>
-                <p:cNvPr id="27" name="Rectangle: Rounded Corners 26">
-                  <a:extLst>
-                    <a:ext uri="{FF2B5EF4-FFF2-40B4-BE49-F238E27FC236}">
-                      <a16:creationId xmlns:a16="http://schemas.microsoft.com/office/drawing/2014/main" id="{56179819-DAD6-4733-BE5E-6F6AC8D0032D}"/>
-                    </a:ext>
-                  </a:extLst>
-                </p:cNvPr>
-                <p:cNvSpPr/>
-                <p:nvPr/>
-              </p:nvSpPr>
-              <p:spPr>
-                <a:xfrm>
-                  <a:off x="4499212" y="2552265"/>
-                  <a:ext cx="443552" cy="300251"/>
-                </a:xfrm>
-                <a:prstGeom prst="roundRect">
-                  <a:avLst/>
-                </a:prstGeom>
-                <a:solidFill>
-                  <a:srgbClr val="FFC000"/>
-                </a:solidFill>
-                <a:ln w="28575">
-                  <a:solidFill>
-                    <a:schemeClr val="tx1"/>
-                  </a:solidFill>
-                  <a:headEnd type="none" w="med" len="med"/>
-                  <a:tailEnd type="none" w="med" len="med"/>
-                </a:ln>
-              </p:spPr>
-              <p:style>
-                <a:lnRef idx="2">
-                  <a:schemeClr val="accent1"/>
-                </a:lnRef>
-                <a:fillRef idx="1">
-                  <a:schemeClr val="lt1"/>
-                </a:fillRef>
-                <a:effectRef idx="0">
-                  <a:schemeClr val="accent1"/>
-                </a:effectRef>
-                <a:fontRef idx="minor">
-                  <a:schemeClr val="dk1"/>
-                </a:fontRef>
-              </p:style>
-              <p:txBody>
-                <a:bodyPr rtlCol="0" anchor="ctr"/>
-                <a:lstStyle/>
-                <a:p>
-                  <a:pPr algn="ctr"/>
-                  <a:endParaRPr lang="en-US" sz="3000"/>
-                </a:p>
-              </p:txBody>
-            </p:sp>
-          </p:grpSp>
-          <p:sp>
-            <p:nvSpPr>
-              <p:cNvPr id="8" name="Arrow: Right 7">
-                <a:extLst>
-                  <a:ext uri="{FF2B5EF4-FFF2-40B4-BE49-F238E27FC236}">
-                    <a16:creationId xmlns:a16="http://schemas.microsoft.com/office/drawing/2014/main" id="{9092CD55-BC3F-41B8-995F-630AD7608A1E}"/>
-                  </a:ext>
-                </a:extLst>
-              </p:cNvPr>
-              <p:cNvSpPr/>
-              <p:nvPr/>
-            </p:nvSpPr>
-            <p:spPr>
-              <a:xfrm>
-                <a:off x="4378036" y="4148381"/>
-                <a:ext cx="415391" cy="211183"/>
-              </a:xfrm>
-              <a:prstGeom prst="rightArrow">
+              <a:prstGeom prst="roundRect">
                 <a:avLst/>
               </a:prstGeom>
               <a:solidFill>
-                <a:schemeClr val="bg1"/>
+                <a:srgbClr val="FFC000"/>
               </a:solidFill>
-              <a:ln>
+              <a:ln w="28575">
                 <a:solidFill>
                   <a:schemeClr val="tx1"/>
                 </a:solidFill>
@@ -4941,16 +4596,16 @@
               <a:lstStyle/>
               <a:p>
                 <a:pPr algn="ctr"/>
-                <a:endParaRPr lang="en-US"/>
+                <a:endParaRPr lang="en-US" sz="3000" dirty="0"/>
               </a:p>
             </p:txBody>
           </p:sp>
           <p:sp>
             <p:nvSpPr>
-              <p:cNvPr id="37" name="Arrow: Right 36">
+              <p:cNvPr id="26" name="Rectangle: Rounded Corners 25">
                 <a:extLst>
                   <a:ext uri="{FF2B5EF4-FFF2-40B4-BE49-F238E27FC236}">
-                    <a16:creationId xmlns:a16="http://schemas.microsoft.com/office/drawing/2014/main" id="{C31F94A3-7B6F-46DB-AFC6-E7AEB2AD4C15}"/>
+                    <a16:creationId xmlns:a16="http://schemas.microsoft.com/office/drawing/2014/main" id="{B10B9B8D-8963-4791-89FD-272106D8095E}"/>
                   </a:ext>
                 </a:extLst>
               </p:cNvPr>
@@ -4958,36 +4613,36 @@
               <p:nvPr/>
             </p:nvSpPr>
             <p:spPr>
-              <a:xfrm flipH="1">
-                <a:off x="2821269" y="4139066"/>
-                <a:ext cx="415391" cy="211183"/>
+              <a:xfrm>
+                <a:off x="3416490" y="2552266"/>
+                <a:ext cx="443552" cy="300251"/>
               </a:xfrm>
-              <a:prstGeom prst="rightArrow">
+              <a:prstGeom prst="roundRect">
                 <a:avLst/>
               </a:prstGeom>
               <a:solidFill>
-                <a:schemeClr val="bg1"/>
+                <a:srgbClr val="FFC000"/>
               </a:solidFill>
-              <a:ln>
+              <a:ln w="28575">
                 <a:solidFill>
                   <a:schemeClr val="tx1"/>
                 </a:solidFill>
+                <a:headEnd type="none" w="med" len="med"/>
+                <a:tailEnd type="none" w="med" len="med"/>
               </a:ln>
             </p:spPr>
             <p:style>
               <a:lnRef idx="2">
-                <a:schemeClr val="accent1">
-                  <a:shade val="50000"/>
-                </a:schemeClr>
+                <a:schemeClr val="accent1"/>
               </a:lnRef>
               <a:fillRef idx="1">
-                <a:schemeClr val="accent1"/>
+                <a:schemeClr val="lt1"/>
               </a:fillRef>
               <a:effectRef idx="0">
                 <a:schemeClr val="accent1"/>
               </a:effectRef>
               <a:fontRef idx="minor">
-                <a:schemeClr val="lt1"/>
+                <a:schemeClr val="dk1"/>
               </a:fontRef>
             </p:style>
             <p:txBody>
@@ -4995,16 +4650,16 @@
               <a:lstStyle/>
               <a:p>
                 <a:pPr algn="ctr"/>
-                <a:endParaRPr lang="en-US"/>
+                <a:endParaRPr lang="en-US" sz="3000"/>
               </a:p>
             </p:txBody>
           </p:sp>
           <p:sp>
             <p:nvSpPr>
-              <p:cNvPr id="38" name="Arrow: Right 37">
+              <p:cNvPr id="27" name="Rectangle: Rounded Corners 26">
                 <a:extLst>
                   <a:ext uri="{FF2B5EF4-FFF2-40B4-BE49-F238E27FC236}">
-                    <a16:creationId xmlns:a16="http://schemas.microsoft.com/office/drawing/2014/main" id="{53DE3E39-D1F2-4FA0-AB4B-2D405BBB0523}"/>
+                    <a16:creationId xmlns:a16="http://schemas.microsoft.com/office/drawing/2014/main" id="{56179819-DAD6-4733-BE5E-6F6AC8D0032D}"/>
                   </a:ext>
                 </a:extLst>
               </p:cNvPr>
@@ -5012,36 +4667,36 @@
               <p:nvPr/>
             </p:nvSpPr>
             <p:spPr>
-              <a:xfrm rot="5400000" flipH="1">
-                <a:off x="3662410" y="3609801"/>
-                <a:ext cx="304526" cy="218636"/>
+              <a:xfrm>
+                <a:off x="4499212" y="2552265"/>
+                <a:ext cx="443552" cy="300251"/>
               </a:xfrm>
-              <a:prstGeom prst="rightArrow">
+              <a:prstGeom prst="roundRect">
                 <a:avLst/>
               </a:prstGeom>
               <a:solidFill>
-                <a:schemeClr val="bg1"/>
+                <a:srgbClr val="FFC000"/>
               </a:solidFill>
-              <a:ln>
+              <a:ln w="28575">
                 <a:solidFill>
                   <a:schemeClr val="tx1"/>
                 </a:solidFill>
+                <a:headEnd type="none" w="med" len="med"/>
+                <a:tailEnd type="none" w="med" len="med"/>
               </a:ln>
             </p:spPr>
             <p:style>
               <a:lnRef idx="2">
-                <a:schemeClr val="accent1">
-                  <a:shade val="50000"/>
-                </a:schemeClr>
+                <a:schemeClr val="accent1"/>
               </a:lnRef>
               <a:fillRef idx="1">
-                <a:schemeClr val="accent1"/>
+                <a:schemeClr val="lt1"/>
               </a:fillRef>
               <a:effectRef idx="0">
                 <a:schemeClr val="accent1"/>
               </a:effectRef>
               <a:fontRef idx="minor">
-                <a:schemeClr val="lt1"/>
+                <a:schemeClr val="dk1"/>
               </a:fontRef>
             </p:style>
             <p:txBody>
@@ -5049,71 +4704,17 @@
               <a:lstStyle/>
               <a:p>
                 <a:pPr algn="ctr"/>
-                <a:endParaRPr lang="en-US"/>
-              </a:p>
-            </p:txBody>
-          </p:sp>
-          <p:sp>
-            <p:nvSpPr>
-              <p:cNvPr id="39" name="Arrow: Right 38">
-                <a:extLst>
-                  <a:ext uri="{FF2B5EF4-FFF2-40B4-BE49-F238E27FC236}">
-                    <a16:creationId xmlns:a16="http://schemas.microsoft.com/office/drawing/2014/main" id="{AD062998-AFE5-4619-9EAB-6DB03F07A74F}"/>
-                  </a:ext>
-                </a:extLst>
-              </p:cNvPr>
-              <p:cNvSpPr/>
-              <p:nvPr/>
-            </p:nvSpPr>
-            <p:spPr>
-              <a:xfrm rot="16200000" flipH="1" flipV="1">
-                <a:off x="3662410" y="4142194"/>
-                <a:ext cx="304526" cy="218636"/>
-              </a:xfrm>
-              <a:prstGeom prst="rightArrow">
-                <a:avLst/>
-              </a:prstGeom>
-              <a:solidFill>
-                <a:schemeClr val="bg1"/>
-              </a:solidFill>
-              <a:ln>
-                <a:solidFill>
-                  <a:schemeClr val="tx1"/>
-                </a:solidFill>
-              </a:ln>
-            </p:spPr>
-            <p:style>
-              <a:lnRef idx="2">
-                <a:schemeClr val="accent1">
-                  <a:shade val="50000"/>
-                </a:schemeClr>
-              </a:lnRef>
-              <a:fillRef idx="1">
-                <a:schemeClr val="accent1"/>
-              </a:fillRef>
-              <a:effectRef idx="0">
-                <a:schemeClr val="accent1"/>
-              </a:effectRef>
-              <a:fontRef idx="minor">
-                <a:schemeClr val="lt1"/>
-              </a:fontRef>
-            </p:style>
-            <p:txBody>
-              <a:bodyPr rtlCol="0" anchor="ctr"/>
-              <a:lstStyle/>
-              <a:p>
-                <a:pPr algn="ctr"/>
-                <a:endParaRPr lang="en-US"/>
+                <a:endParaRPr lang="en-US" sz="3000"/>
               </a:p>
             </p:txBody>
           </p:sp>
         </p:grpSp>
         <p:sp>
           <p:nvSpPr>
-            <p:cNvPr id="40" name="Arrow: Right 39">
+            <p:cNvPr id="8" name="Arrow: Right 7">
               <a:extLst>
                 <a:ext uri="{FF2B5EF4-FFF2-40B4-BE49-F238E27FC236}">
-                  <a16:creationId xmlns:a16="http://schemas.microsoft.com/office/drawing/2014/main" id="{7ADA9282-F1DC-4669-A738-2F75576DE909}"/>
+                  <a16:creationId xmlns:a16="http://schemas.microsoft.com/office/drawing/2014/main" id="{9092CD55-BC3F-41B8-995F-630AD7608A1E}"/>
                 </a:ext>
               </a:extLst>
             </p:cNvPr>
@@ -5122,22 +4723,19 @@
           </p:nvSpPr>
           <p:spPr>
             <a:xfrm>
-              <a:off x="1562152" y="3715947"/>
-              <a:ext cx="1019059" cy="565304"/>
+              <a:off x="4378036" y="4148381"/>
+              <a:ext cx="415391" cy="211183"/>
             </a:xfrm>
             <a:prstGeom prst="rightArrow">
-              <a:avLst>
-                <a:gd name="adj1" fmla="val 43464"/>
-                <a:gd name="adj2" fmla="val 119660"/>
-              </a:avLst>
+              <a:avLst/>
             </a:prstGeom>
             <a:solidFill>
-              <a:schemeClr val="bg1">
-                <a:lumMod val="75000"/>
-              </a:schemeClr>
+              <a:schemeClr val="bg1"/>
             </a:solidFill>
             <a:ln>
-              <a:noFill/>
+              <a:solidFill>
+                <a:schemeClr val="tx1"/>
+              </a:solidFill>
             </a:ln>
           </p:spPr>
           <p:style>
@@ -5161,16 +4759,16 @@
             <a:lstStyle/>
             <a:p>
               <a:pPr algn="ctr"/>
-              <a:endParaRPr lang="en-US" dirty="0"/>
+              <a:endParaRPr lang="en-US"/>
             </a:p>
           </p:txBody>
         </p:sp>
         <p:sp>
           <p:nvSpPr>
-            <p:cNvPr id="41" name="Arrow: Right 40">
+            <p:cNvPr id="37" name="Arrow: Right 36">
               <a:extLst>
                 <a:ext uri="{FF2B5EF4-FFF2-40B4-BE49-F238E27FC236}">
-                  <a16:creationId xmlns:a16="http://schemas.microsoft.com/office/drawing/2014/main" id="{1ECA1FD5-680D-48AB-B781-06B80CA982A0}"/>
+                  <a16:creationId xmlns:a16="http://schemas.microsoft.com/office/drawing/2014/main" id="{C31F94A3-7B6F-46DB-AFC6-E7AEB2AD4C15}"/>
                 </a:ext>
               </a:extLst>
             </p:cNvPr>
@@ -5178,23 +4776,20 @@
             <p:nvPr/>
           </p:nvSpPr>
           <p:spPr>
-            <a:xfrm>
-              <a:off x="5291740" y="3715947"/>
-              <a:ext cx="1019059" cy="565304"/>
+            <a:xfrm flipH="1">
+              <a:off x="2821269" y="4139066"/>
+              <a:ext cx="415391" cy="211183"/>
             </a:xfrm>
             <a:prstGeom prst="rightArrow">
-              <a:avLst>
-                <a:gd name="adj1" fmla="val 43464"/>
-                <a:gd name="adj2" fmla="val 119660"/>
-              </a:avLst>
+              <a:avLst/>
             </a:prstGeom>
             <a:solidFill>
-              <a:schemeClr val="bg1">
-                <a:lumMod val="75000"/>
-              </a:schemeClr>
+              <a:schemeClr val="bg1"/>
             </a:solidFill>
             <a:ln>
-              <a:noFill/>
+              <a:solidFill>
+                <a:schemeClr val="tx1"/>
+              </a:solidFill>
             </a:ln>
           </p:spPr>
           <p:style>
@@ -5218,17 +4813,239 @@
             <a:lstStyle/>
             <a:p>
               <a:pPr algn="ctr"/>
-              <a:endParaRPr lang="en-US" dirty="0"/>
+              <a:endParaRPr lang="en-US"/>
+            </a:p>
+          </p:txBody>
+        </p:sp>
+        <p:sp>
+          <p:nvSpPr>
+            <p:cNvPr id="38" name="Arrow: Right 37">
+              <a:extLst>
+                <a:ext uri="{FF2B5EF4-FFF2-40B4-BE49-F238E27FC236}">
+                  <a16:creationId xmlns:a16="http://schemas.microsoft.com/office/drawing/2014/main" id="{53DE3E39-D1F2-4FA0-AB4B-2D405BBB0523}"/>
+                </a:ext>
+              </a:extLst>
+            </p:cNvPr>
+            <p:cNvSpPr/>
+            <p:nvPr/>
+          </p:nvSpPr>
+          <p:spPr>
+            <a:xfrm rot="5400000" flipH="1">
+              <a:off x="3662410" y="3609801"/>
+              <a:ext cx="304526" cy="218636"/>
+            </a:xfrm>
+            <a:prstGeom prst="rightArrow">
+              <a:avLst/>
+            </a:prstGeom>
+            <a:solidFill>
+              <a:schemeClr val="bg1"/>
+            </a:solidFill>
+            <a:ln>
+              <a:solidFill>
+                <a:schemeClr val="tx1"/>
+              </a:solidFill>
+            </a:ln>
+          </p:spPr>
+          <p:style>
+            <a:lnRef idx="2">
+              <a:schemeClr val="accent1">
+                <a:shade val="50000"/>
+              </a:schemeClr>
+            </a:lnRef>
+            <a:fillRef idx="1">
+              <a:schemeClr val="accent1"/>
+            </a:fillRef>
+            <a:effectRef idx="0">
+              <a:schemeClr val="accent1"/>
+            </a:effectRef>
+            <a:fontRef idx="minor">
+              <a:schemeClr val="lt1"/>
+            </a:fontRef>
+          </p:style>
+          <p:txBody>
+            <a:bodyPr rtlCol="0" anchor="ctr"/>
+            <a:lstStyle/>
+            <a:p>
+              <a:pPr algn="ctr"/>
+              <a:endParaRPr lang="en-US"/>
+            </a:p>
+          </p:txBody>
+        </p:sp>
+        <p:sp>
+          <p:nvSpPr>
+            <p:cNvPr id="39" name="Arrow: Right 38">
+              <a:extLst>
+                <a:ext uri="{FF2B5EF4-FFF2-40B4-BE49-F238E27FC236}">
+                  <a16:creationId xmlns:a16="http://schemas.microsoft.com/office/drawing/2014/main" id="{AD062998-AFE5-4619-9EAB-6DB03F07A74F}"/>
+                </a:ext>
+              </a:extLst>
+            </p:cNvPr>
+            <p:cNvSpPr/>
+            <p:nvPr/>
+          </p:nvSpPr>
+          <p:spPr>
+            <a:xfrm rot="16200000" flipH="1" flipV="1">
+              <a:off x="3662410" y="4142194"/>
+              <a:ext cx="304526" cy="218636"/>
+            </a:xfrm>
+            <a:prstGeom prst="rightArrow">
+              <a:avLst/>
+            </a:prstGeom>
+            <a:solidFill>
+              <a:schemeClr val="bg1"/>
+            </a:solidFill>
+            <a:ln>
+              <a:solidFill>
+                <a:schemeClr val="tx1"/>
+              </a:solidFill>
+            </a:ln>
+          </p:spPr>
+          <p:style>
+            <a:lnRef idx="2">
+              <a:schemeClr val="accent1">
+                <a:shade val="50000"/>
+              </a:schemeClr>
+            </a:lnRef>
+            <a:fillRef idx="1">
+              <a:schemeClr val="accent1"/>
+            </a:fillRef>
+            <a:effectRef idx="0">
+              <a:schemeClr val="accent1"/>
+            </a:effectRef>
+            <a:fontRef idx="minor">
+              <a:schemeClr val="lt1"/>
+            </a:fontRef>
+          </p:style>
+          <p:txBody>
+            <a:bodyPr rtlCol="0" anchor="ctr"/>
+            <a:lstStyle/>
+            <a:p>
+              <a:pPr algn="ctr"/>
+              <a:endParaRPr lang="en-US"/>
             </a:p>
           </p:txBody>
         </p:sp>
       </p:grpSp>
+      <p:sp>
+        <p:nvSpPr>
+          <p:cNvPr id="40" name="Arrow: Right 39">
+            <a:extLst>
+              <a:ext uri="{FF2B5EF4-FFF2-40B4-BE49-F238E27FC236}">
+                <a16:creationId xmlns:a16="http://schemas.microsoft.com/office/drawing/2014/main" id="{7ADA9282-F1DC-4669-A738-2F75576DE909}"/>
+              </a:ext>
+            </a:extLst>
+          </p:cNvPr>
+          <p:cNvSpPr/>
+          <p:nvPr/>
+        </p:nvSpPr>
+        <p:spPr>
+          <a:xfrm>
+            <a:off x="1562153" y="3348491"/>
+            <a:ext cx="1019059" cy="565304"/>
+          </a:xfrm>
+          <a:prstGeom prst="rightArrow">
+            <a:avLst>
+              <a:gd name="adj1" fmla="val 43464"/>
+              <a:gd name="adj2" fmla="val 119660"/>
+            </a:avLst>
+          </a:prstGeom>
+          <a:solidFill>
+            <a:schemeClr val="bg1">
+              <a:lumMod val="75000"/>
+            </a:schemeClr>
+          </a:solidFill>
+          <a:ln>
+            <a:noFill/>
+          </a:ln>
+        </p:spPr>
+        <p:style>
+          <a:lnRef idx="2">
+            <a:schemeClr val="accent1">
+              <a:shade val="50000"/>
+            </a:schemeClr>
+          </a:lnRef>
+          <a:fillRef idx="1">
+            <a:schemeClr val="accent1"/>
+          </a:fillRef>
+          <a:effectRef idx="0">
+            <a:schemeClr val="accent1"/>
+          </a:effectRef>
+          <a:fontRef idx="minor">
+            <a:schemeClr val="lt1"/>
+          </a:fontRef>
+        </p:style>
+        <p:txBody>
+          <a:bodyPr rtlCol="0" anchor="ctr"/>
+          <a:lstStyle/>
+          <a:p>
+            <a:pPr algn="ctr"/>
+            <a:endParaRPr lang="en-US" dirty="0"/>
+          </a:p>
+        </p:txBody>
+      </p:sp>
+      <p:sp>
+        <p:nvSpPr>
+          <p:cNvPr id="41" name="Arrow: Right 40">
+            <a:extLst>
+              <a:ext uri="{FF2B5EF4-FFF2-40B4-BE49-F238E27FC236}">
+                <a16:creationId xmlns:a16="http://schemas.microsoft.com/office/drawing/2014/main" id="{1ECA1FD5-680D-48AB-B781-06B80CA982A0}"/>
+              </a:ext>
+            </a:extLst>
+          </p:cNvPr>
+          <p:cNvSpPr/>
+          <p:nvPr/>
+        </p:nvSpPr>
+        <p:spPr>
+          <a:xfrm>
+            <a:off x="5911535" y="3346791"/>
+            <a:ext cx="1019059" cy="565304"/>
+          </a:xfrm>
+          <a:prstGeom prst="rightArrow">
+            <a:avLst>
+              <a:gd name="adj1" fmla="val 43464"/>
+              <a:gd name="adj2" fmla="val 119660"/>
+            </a:avLst>
+          </a:prstGeom>
+          <a:solidFill>
+            <a:schemeClr val="bg1">
+              <a:lumMod val="75000"/>
+            </a:schemeClr>
+          </a:solidFill>
+          <a:ln>
+            <a:noFill/>
+          </a:ln>
+        </p:spPr>
+        <p:style>
+          <a:lnRef idx="2">
+            <a:schemeClr val="accent1">
+              <a:shade val="50000"/>
+            </a:schemeClr>
+          </a:lnRef>
+          <a:fillRef idx="1">
+            <a:schemeClr val="accent1"/>
+          </a:fillRef>
+          <a:effectRef idx="0">
+            <a:schemeClr val="accent1"/>
+          </a:effectRef>
+          <a:fontRef idx="minor">
+            <a:schemeClr val="lt1"/>
+          </a:fontRef>
+        </p:style>
+        <p:txBody>
+          <a:bodyPr rtlCol="0" anchor="ctr"/>
+          <a:lstStyle/>
+          <a:p>
+            <a:pPr algn="ctr"/>
+            <a:endParaRPr lang="en-US" dirty="0"/>
+          </a:p>
+        </p:txBody>
+      </p:sp>
       <p:grpSp>
         <p:nvGrpSpPr>
-          <p:cNvPr id="43" name="Group 42">
+          <p:cNvPr id="44" name="Group 43">
             <a:extLst>
               <a:ext uri="{FF2B5EF4-FFF2-40B4-BE49-F238E27FC236}">
-                <a16:creationId xmlns:a16="http://schemas.microsoft.com/office/drawing/2014/main" id="{E1CB3E9E-0F83-4A8F-8713-49C995C1AB6C}"/>
+                <a16:creationId xmlns:a16="http://schemas.microsoft.com/office/drawing/2014/main" id="{651A690B-ABDA-4189-B35E-9881C52EB59A}"/>
               </a:ext>
             </a:extLst>
           </p:cNvPr>
@@ -5237,140 +5054,97 @@
         </p:nvGrpSpPr>
         <p:grpSpPr>
           <a:xfrm>
-            <a:off x="813162" y="5095936"/>
-            <a:ext cx="7556460" cy="949574"/>
-            <a:chOff x="830302" y="3523812"/>
-            <a:chExt cx="7556460" cy="949574"/>
+            <a:off x="813162" y="5291228"/>
+            <a:ext cx="443552" cy="558990"/>
+            <a:chOff x="1577753" y="3690492"/>
+            <a:chExt cx="443552" cy="558990"/>
           </a:xfrm>
         </p:grpSpPr>
-        <p:grpSp>
-          <p:nvGrpSpPr>
-            <p:cNvPr id="44" name="Group 43">
+        <p:sp>
+          <p:nvSpPr>
+            <p:cNvPr id="60" name="Rectangle: Rounded Corners 59">
               <a:extLst>
                 <a:ext uri="{FF2B5EF4-FFF2-40B4-BE49-F238E27FC236}">
-                  <a16:creationId xmlns:a16="http://schemas.microsoft.com/office/drawing/2014/main" id="{651A690B-ABDA-4189-B35E-9881C52EB59A}"/>
+                  <a16:creationId xmlns:a16="http://schemas.microsoft.com/office/drawing/2014/main" id="{ADD6421F-ED4B-4ED9-BDDA-36F281B92751}"/>
                 </a:ext>
               </a:extLst>
             </p:cNvPr>
-            <p:cNvGrpSpPr/>
+            <p:cNvSpPr/>
             <p:nvPr/>
-          </p:nvGrpSpPr>
-          <p:grpSpPr>
+          </p:nvSpPr>
+          <p:spPr>
             <a:xfrm>
-              <a:off x="830302" y="3719104"/>
-              <a:ext cx="443552" cy="558990"/>
-              <a:chOff x="1577753" y="3690492"/>
-              <a:chExt cx="443552" cy="558990"/>
+              <a:off x="1577753" y="3690492"/>
+              <a:ext cx="443552" cy="553998"/>
             </a:xfrm>
-          </p:grpSpPr>
-          <p:sp>
-            <p:nvSpPr>
-              <p:cNvPr id="60" name="Rectangle: Rounded Corners 59">
-                <a:extLst>
-                  <a:ext uri="{FF2B5EF4-FFF2-40B4-BE49-F238E27FC236}">
-                    <a16:creationId xmlns:a16="http://schemas.microsoft.com/office/drawing/2014/main" id="{ADD6421F-ED4B-4ED9-BDDA-36F281B92751}"/>
-                  </a:ext>
-                </a:extLst>
-              </p:cNvPr>
-              <p:cNvSpPr/>
-              <p:nvPr/>
-            </p:nvSpPr>
-            <p:spPr>
-              <a:xfrm>
-                <a:off x="1577753" y="3690492"/>
-                <a:ext cx="443552" cy="553998"/>
-              </a:xfrm>
-              <a:prstGeom prst="roundRect">
-                <a:avLst/>
-              </a:prstGeom>
+            <a:prstGeom prst="roundRect">
+              <a:avLst/>
+            </a:prstGeom>
+            <a:solidFill>
+              <a:srgbClr val="FFC000"/>
+            </a:solidFill>
+            <a:ln w="38100">
               <a:solidFill>
-                <a:srgbClr val="FFC000"/>
+                <a:schemeClr val="tx1"/>
               </a:solidFill>
-              <a:ln w="38100">
-                <a:solidFill>
-                  <a:schemeClr val="tx1"/>
-                </a:solidFill>
-              </a:ln>
-            </p:spPr>
-            <p:style>
-              <a:lnRef idx="2">
-                <a:schemeClr val="accent1">
-                  <a:shade val="50000"/>
-                </a:schemeClr>
-              </a:lnRef>
-              <a:fillRef idx="1">
-                <a:schemeClr val="accent1"/>
-              </a:fillRef>
-              <a:effectRef idx="0">
-                <a:schemeClr val="accent1"/>
-              </a:effectRef>
-              <a:fontRef idx="minor">
-                <a:schemeClr val="lt1"/>
-              </a:fontRef>
-            </p:style>
-            <p:txBody>
-              <a:bodyPr rtlCol="0" anchor="ctr"/>
-              <a:lstStyle/>
-              <a:p>
-                <a:pPr algn="ctr"/>
-                <a:endParaRPr lang="en-US"/>
-              </a:p>
-            </p:txBody>
-          </p:sp>
-          <p:sp>
-            <p:nvSpPr>
-              <p:cNvPr id="61" name="Rectangle 60">
-                <a:extLst>
-                  <a:ext uri="{FF2B5EF4-FFF2-40B4-BE49-F238E27FC236}">
-                    <a16:creationId xmlns:a16="http://schemas.microsoft.com/office/drawing/2014/main" id="{9E66DA8C-D600-4948-AA10-191B91FF2DB9}"/>
-                  </a:ext>
-                </a:extLst>
-              </p:cNvPr>
-              <p:cNvSpPr/>
-              <p:nvPr/>
-            </p:nvSpPr>
-            <p:spPr>
-              <a:xfrm>
-                <a:off x="1598990" y="3695484"/>
-                <a:ext cx="391454" cy="553998"/>
-              </a:xfrm>
-              <a:prstGeom prst="rect">
-                <a:avLst/>
-              </a:prstGeom>
-              <a:noFill/>
-            </p:spPr>
-            <p:txBody>
-              <a:bodyPr wrap="none" lIns="91440" tIns="45720" rIns="91440" bIns="45720">
-                <a:spAutoFit/>
-              </a:bodyPr>
-              <a:lstStyle/>
-              <a:p>
-                <a:pPr algn="ctr"/>
-                <a:r>
-                  <a:rPr lang="en-US" sz="3000" b="1" spc="50" dirty="0">
-                    <a:ln w="9525" cmpd="sng">
-                      <a:solidFill>
-                        <a:schemeClr val="tx1"/>
-                      </a:solidFill>
-                      <a:prstDash val="solid"/>
-                    </a:ln>
-                    <a:solidFill>
-                      <a:srgbClr val="70AD47">
-                        <a:tint val="1000"/>
-                      </a:srgbClr>
-                    </a:solidFill>
-                    <a:effectLst>
-                      <a:glow rad="38100">
-                        <a:schemeClr val="accent1">
-                          <a:alpha val="40000"/>
-                        </a:schemeClr>
-                      </a:glow>
-                    </a:effectLst>
-                    <a:latin typeface="Abadi" panose="020B0604020104020204" pitchFamily="34" charset="0"/>
-                  </a:rPr>
-                  <a:t>S</a:t>
-                </a:r>
-                <a:endParaRPr lang="en-US" sz="3000" b="1" cap="none" spc="50" dirty="0">
+            </a:ln>
+          </p:spPr>
+          <p:style>
+            <a:lnRef idx="2">
+              <a:schemeClr val="accent1">
+                <a:shade val="50000"/>
+              </a:schemeClr>
+            </a:lnRef>
+            <a:fillRef idx="1">
+              <a:schemeClr val="accent1"/>
+            </a:fillRef>
+            <a:effectRef idx="0">
+              <a:schemeClr val="accent1"/>
+            </a:effectRef>
+            <a:fontRef idx="minor">
+              <a:schemeClr val="lt1"/>
+            </a:fontRef>
+          </p:style>
+          <p:txBody>
+            <a:bodyPr rtlCol="0" anchor="ctr"/>
+            <a:lstStyle/>
+            <a:p>
+              <a:pPr algn="ctr"/>
+              <a:endParaRPr lang="en-US"/>
+            </a:p>
+          </p:txBody>
+        </p:sp>
+        <p:sp>
+          <p:nvSpPr>
+            <p:cNvPr id="61" name="Rectangle 60">
+              <a:extLst>
+                <a:ext uri="{FF2B5EF4-FFF2-40B4-BE49-F238E27FC236}">
+                  <a16:creationId xmlns:a16="http://schemas.microsoft.com/office/drawing/2014/main" id="{9E66DA8C-D600-4948-AA10-191B91FF2DB9}"/>
+                </a:ext>
+              </a:extLst>
+            </p:cNvPr>
+            <p:cNvSpPr/>
+            <p:nvPr/>
+          </p:nvSpPr>
+          <p:spPr>
+            <a:xfrm>
+              <a:off x="1598990" y="3695484"/>
+              <a:ext cx="391454" cy="553998"/>
+            </a:xfrm>
+            <a:prstGeom prst="rect">
+              <a:avLst/>
+            </a:prstGeom>
+            <a:noFill/>
+          </p:spPr>
+          <p:txBody>
+            <a:bodyPr wrap="none" lIns="91440" tIns="45720" rIns="91440" bIns="45720">
+              <a:spAutoFit/>
+            </a:bodyPr>
+            <a:lstStyle/>
+            <a:p>
+              <a:pPr algn="ctr"/>
+              <a:r>
+                <a:rPr lang="en-US" sz="3000" b="1" spc="50" dirty="0">
                   <a:ln w="9525" cmpd="sng">
                     <a:solidFill>
                       <a:schemeClr val="tx1"/>
@@ -5390,17 +5164,212 @@
                     </a:glow>
                   </a:effectLst>
                   <a:latin typeface="Abadi" panose="020B0604020104020204" pitchFamily="34" charset="0"/>
-                </a:endParaRPr>
-              </a:p>
-            </p:txBody>
-          </p:sp>
-        </p:grpSp>
+                </a:rPr>
+                <a:t>S</a:t>
+              </a:r>
+              <a:endParaRPr lang="en-US" sz="3000" b="1" cap="none" spc="50" dirty="0">
+                <a:ln w="9525" cmpd="sng">
+                  <a:solidFill>
+                    <a:schemeClr val="tx1"/>
+                  </a:solidFill>
+                  <a:prstDash val="solid"/>
+                </a:ln>
+                <a:solidFill>
+                  <a:srgbClr val="70AD47">
+                    <a:tint val="1000"/>
+                  </a:srgbClr>
+                </a:solidFill>
+                <a:effectLst>
+                  <a:glow rad="38100">
+                    <a:schemeClr val="accent1">
+                      <a:alpha val="40000"/>
+                    </a:schemeClr>
+                  </a:glow>
+                </a:effectLst>
+                <a:latin typeface="Abadi" panose="020B0604020104020204" pitchFamily="34" charset="0"/>
+              </a:endParaRPr>
+            </a:p>
+          </p:txBody>
+        </p:sp>
+      </p:grpSp>
+      <p:grpSp>
+        <p:nvGrpSpPr>
+          <p:cNvPr id="45" name="Group 44">
+            <a:extLst>
+              <a:ext uri="{FF2B5EF4-FFF2-40B4-BE49-F238E27FC236}">
+                <a16:creationId xmlns:a16="http://schemas.microsoft.com/office/drawing/2014/main" id="{054EACDA-5856-4A7E-ADFE-99E965C92801}"/>
+              </a:ext>
+            </a:extLst>
+          </p:cNvPr>
+          <p:cNvGrpSpPr/>
+          <p:nvPr/>
+        </p:nvGrpSpPr>
+        <p:grpSpPr>
+          <a:xfrm>
+            <a:off x="7105811" y="5289528"/>
+            <a:ext cx="1804093" cy="558990"/>
+            <a:chOff x="2863959" y="5152341"/>
+            <a:chExt cx="1804093" cy="558990"/>
+          </a:xfrm>
+        </p:grpSpPr>
+        <p:sp>
+          <p:nvSpPr>
+            <p:cNvPr id="58" name="Rectangle: Rounded Corners 57">
+              <a:extLst>
+                <a:ext uri="{FF2B5EF4-FFF2-40B4-BE49-F238E27FC236}">
+                  <a16:creationId xmlns:a16="http://schemas.microsoft.com/office/drawing/2014/main" id="{F970BCDE-EBF2-40E7-8450-B7C3004752DC}"/>
+                </a:ext>
+              </a:extLst>
+            </p:cNvPr>
+            <p:cNvSpPr/>
+            <p:nvPr/>
+          </p:nvSpPr>
+          <p:spPr>
+            <a:xfrm>
+              <a:off x="2863959" y="5152341"/>
+              <a:ext cx="1804093" cy="553998"/>
+            </a:xfrm>
+            <a:prstGeom prst="roundRect">
+              <a:avLst/>
+            </a:prstGeom>
+            <a:solidFill>
+              <a:srgbClr val="00FF00"/>
+            </a:solidFill>
+            <a:ln w="38100">
+              <a:solidFill>
+                <a:schemeClr val="tx1"/>
+              </a:solidFill>
+            </a:ln>
+          </p:spPr>
+          <p:style>
+            <a:lnRef idx="2">
+              <a:schemeClr val="accent1">
+                <a:shade val="50000"/>
+              </a:schemeClr>
+            </a:lnRef>
+            <a:fillRef idx="1">
+              <a:schemeClr val="accent1"/>
+            </a:fillRef>
+            <a:effectRef idx="0">
+              <a:schemeClr val="accent1"/>
+            </a:effectRef>
+            <a:fontRef idx="minor">
+              <a:schemeClr val="lt1"/>
+            </a:fontRef>
+          </p:style>
+          <p:txBody>
+            <a:bodyPr rtlCol="0" anchor="ctr"/>
+            <a:lstStyle/>
+            <a:p>
+              <a:pPr algn="ctr"/>
+              <a:endParaRPr lang="en-US" sz="3000"/>
+            </a:p>
+          </p:txBody>
+        </p:sp>
+        <p:sp>
+          <p:nvSpPr>
+            <p:cNvPr id="59" name="Rectangle 58">
+              <a:extLst>
+                <a:ext uri="{FF2B5EF4-FFF2-40B4-BE49-F238E27FC236}">
+                  <a16:creationId xmlns:a16="http://schemas.microsoft.com/office/drawing/2014/main" id="{517F7959-81C8-45A5-8964-29820D719F93}"/>
+                </a:ext>
+              </a:extLst>
+            </p:cNvPr>
+            <p:cNvSpPr/>
+            <p:nvPr/>
+          </p:nvSpPr>
+          <p:spPr>
+            <a:xfrm>
+              <a:off x="2863959" y="5157333"/>
+              <a:ext cx="1804093" cy="553998"/>
+            </a:xfrm>
+            <a:prstGeom prst="rect">
+              <a:avLst/>
+            </a:prstGeom>
+            <a:noFill/>
+          </p:spPr>
+          <p:txBody>
+            <a:bodyPr wrap="square" lIns="91440" tIns="45720" rIns="91440" bIns="45720">
+              <a:spAutoFit/>
+            </a:bodyPr>
+            <a:lstStyle/>
+            <a:p>
+              <a:pPr algn="ctr"/>
+              <a:r>
+                <a:rPr lang="en-US" sz="3000" b="1" spc="50" dirty="0">
+                  <a:ln w="9525" cmpd="sng">
+                    <a:solidFill>
+                      <a:schemeClr val="tx1"/>
+                    </a:solidFill>
+                    <a:prstDash val="solid"/>
+                  </a:ln>
+                  <a:solidFill>
+                    <a:srgbClr val="70AD47">
+                      <a:tint val="1000"/>
+                    </a:srgbClr>
+                  </a:solidFill>
+                  <a:effectLst>
+                    <a:glow rad="38100">
+                      <a:schemeClr val="accent1">
+                        <a:alpha val="40000"/>
+                      </a:schemeClr>
+                    </a:glow>
+                  </a:effectLst>
+                  <a:latin typeface="Abadi" panose="020B0604020104020204" pitchFamily="34" charset="0"/>
+                </a:rPr>
+                <a:t>SPACE</a:t>
+              </a:r>
+              <a:endParaRPr lang="en-US" sz="3000" b="1" cap="none" spc="50" dirty="0">
+                <a:ln w="9525" cmpd="sng">
+                  <a:solidFill>
+                    <a:schemeClr val="tx1"/>
+                  </a:solidFill>
+                  <a:prstDash val="solid"/>
+                </a:ln>
+                <a:solidFill>
+                  <a:srgbClr val="70AD47">
+                    <a:tint val="1000"/>
+                  </a:srgbClr>
+                </a:solidFill>
+                <a:effectLst>
+                  <a:glow rad="38100">
+                    <a:schemeClr val="accent1">
+                      <a:alpha val="40000"/>
+                    </a:schemeClr>
+                  </a:glow>
+                </a:effectLst>
+                <a:latin typeface="Abadi" panose="020B0604020104020204" pitchFamily="34" charset="0"/>
+              </a:endParaRPr>
+            </a:p>
+          </p:txBody>
+        </p:sp>
+      </p:grpSp>
+      <p:grpSp>
+        <p:nvGrpSpPr>
+          <p:cNvPr id="46" name="Group 45">
+            <a:extLst>
+              <a:ext uri="{FF2B5EF4-FFF2-40B4-BE49-F238E27FC236}">
+                <a16:creationId xmlns:a16="http://schemas.microsoft.com/office/drawing/2014/main" id="{9C27DE4D-A6C4-445B-AB51-AF5F839E616E}"/>
+              </a:ext>
+            </a:extLst>
+          </p:cNvPr>
+          <p:cNvGrpSpPr/>
+          <p:nvPr/>
+        </p:nvGrpSpPr>
+        <p:grpSpPr>
+          <a:xfrm>
+            <a:off x="3604486" y="5095936"/>
+            <a:ext cx="629692" cy="949574"/>
+            <a:chOff x="3495552" y="3508212"/>
+            <a:chExt cx="629692" cy="949574"/>
+          </a:xfrm>
+        </p:grpSpPr>
         <p:grpSp>
           <p:nvGrpSpPr>
-            <p:cNvPr id="45" name="Group 44">
+            <p:cNvPr id="49" name="Group 48">
               <a:extLst>
                 <a:ext uri="{FF2B5EF4-FFF2-40B4-BE49-F238E27FC236}">
-                  <a16:creationId xmlns:a16="http://schemas.microsoft.com/office/drawing/2014/main" id="{054EACDA-5856-4A7E-ADFE-99E965C92801}"/>
+                  <a16:creationId xmlns:a16="http://schemas.microsoft.com/office/drawing/2014/main" id="{1C0EDB94-FD9A-4CDF-8CF9-4A7BA51CB22A}"/>
                 </a:ext>
               </a:extLst>
             </p:cNvPr>
@@ -5409,18 +5378,18 @@
           </p:nvGrpSpPr>
           <p:grpSpPr>
             <a:xfrm>
-              <a:off x="6582669" y="3719104"/>
-              <a:ext cx="1804093" cy="558990"/>
-              <a:chOff x="2863959" y="5152341"/>
-              <a:chExt cx="1804093" cy="558990"/>
+              <a:off x="3495552" y="3508212"/>
+              <a:ext cx="629692" cy="949574"/>
+              <a:chOff x="3957851" y="2183642"/>
+              <a:chExt cx="443552" cy="668875"/>
             </a:xfrm>
           </p:grpSpPr>
           <p:sp>
             <p:nvSpPr>
-              <p:cNvPr id="58" name="Rectangle: Rounded Corners 57">
+              <p:cNvPr id="54" name="Rectangle: Rounded Corners 53">
                 <a:extLst>
                   <a:ext uri="{FF2B5EF4-FFF2-40B4-BE49-F238E27FC236}">
-                    <a16:creationId xmlns:a16="http://schemas.microsoft.com/office/drawing/2014/main" id="{F970BCDE-EBF2-40E7-8450-B7C3004752DC}"/>
+                    <a16:creationId xmlns:a16="http://schemas.microsoft.com/office/drawing/2014/main" id="{0CF4464D-5372-4C84-8E9B-9AB0C44E1706}"/>
                   </a:ext>
                 </a:extLst>
               </p:cNvPr>
@@ -5429,16 +5398,16 @@
             </p:nvSpPr>
             <p:spPr>
               <a:xfrm>
-                <a:off x="2863959" y="5152341"/>
-                <a:ext cx="1804093" cy="553998"/>
+                <a:off x="3957851" y="2183642"/>
+                <a:ext cx="443552" cy="300251"/>
               </a:xfrm>
               <a:prstGeom prst="roundRect">
                 <a:avLst/>
               </a:prstGeom>
               <a:solidFill>
-                <a:srgbClr val="00FF00"/>
+                <a:srgbClr val="FFC000"/>
               </a:solidFill>
-              <a:ln w="38100">
+              <a:ln w="28575">
                 <a:solidFill>
                   <a:schemeClr val="tx1"/>
                 </a:solidFill>
@@ -5471,10 +5440,10 @@
           </p:sp>
           <p:sp>
             <p:nvSpPr>
-              <p:cNvPr id="59" name="Rectangle 58">
+              <p:cNvPr id="55" name="Rectangle: Rounded Corners 54">
                 <a:extLst>
                   <a:ext uri="{FF2B5EF4-FFF2-40B4-BE49-F238E27FC236}">
-                    <a16:creationId xmlns:a16="http://schemas.microsoft.com/office/drawing/2014/main" id="{517F7959-81C8-45A5-8964-29820D719F93}"/>
+                    <a16:creationId xmlns:a16="http://schemas.microsoft.com/office/drawing/2014/main" id="{5F465A5A-2A73-4F90-963C-B3F306010C5C}"/>
                   </a:ext>
                 </a:extLst>
               </p:cNvPr>
@@ -5483,243 +5452,16 @@
             </p:nvSpPr>
             <p:spPr>
               <a:xfrm>
-                <a:off x="2863959" y="5157333"/>
-                <a:ext cx="1804093" cy="553998"/>
+                <a:off x="3957851" y="2552266"/>
+                <a:ext cx="443552" cy="300251"/>
               </a:xfrm>
-              <a:prstGeom prst="rect">
-                <a:avLst/>
-              </a:prstGeom>
-              <a:noFill/>
-            </p:spPr>
-            <p:txBody>
-              <a:bodyPr wrap="square" lIns="91440" tIns="45720" rIns="91440" bIns="45720">
-                <a:spAutoFit/>
-              </a:bodyPr>
-              <a:lstStyle/>
-              <a:p>
-                <a:pPr algn="ctr"/>
-                <a:r>
-                  <a:rPr lang="en-US" sz="3000" b="1" spc="50" dirty="0">
-                    <a:ln w="9525" cmpd="sng">
-                      <a:solidFill>
-                        <a:schemeClr val="tx1"/>
-                      </a:solidFill>
-                      <a:prstDash val="solid"/>
-                    </a:ln>
-                    <a:solidFill>
-                      <a:srgbClr val="70AD47">
-                        <a:tint val="1000"/>
-                      </a:srgbClr>
-                    </a:solidFill>
-                    <a:effectLst>
-                      <a:glow rad="38100">
-                        <a:schemeClr val="accent1">
-                          <a:alpha val="40000"/>
-                        </a:schemeClr>
-                      </a:glow>
-                    </a:effectLst>
-                    <a:latin typeface="Abadi" panose="020B0604020104020204" pitchFamily="34" charset="0"/>
-                  </a:rPr>
-                  <a:t>SPACE</a:t>
-                </a:r>
-                <a:endParaRPr lang="en-US" sz="3000" b="1" cap="none" spc="50" dirty="0">
-                  <a:ln w="9525" cmpd="sng">
-                    <a:solidFill>
-                      <a:schemeClr val="tx1"/>
-                    </a:solidFill>
-                    <a:prstDash val="solid"/>
-                  </a:ln>
-                  <a:solidFill>
-                    <a:srgbClr val="70AD47">
-                      <a:tint val="1000"/>
-                    </a:srgbClr>
-                  </a:solidFill>
-                  <a:effectLst>
-                    <a:glow rad="38100">
-                      <a:schemeClr val="accent1">
-                        <a:alpha val="40000"/>
-                      </a:schemeClr>
-                    </a:glow>
-                  </a:effectLst>
-                  <a:latin typeface="Abadi" panose="020B0604020104020204" pitchFamily="34" charset="0"/>
-                </a:endParaRPr>
-              </a:p>
-            </p:txBody>
-          </p:sp>
-        </p:grpSp>
-        <p:grpSp>
-          <p:nvGrpSpPr>
-            <p:cNvPr id="46" name="Group 45">
-              <a:extLst>
-                <a:ext uri="{FF2B5EF4-FFF2-40B4-BE49-F238E27FC236}">
-                  <a16:creationId xmlns:a16="http://schemas.microsoft.com/office/drawing/2014/main" id="{9C27DE4D-A6C4-445B-AB51-AF5F839E616E}"/>
-                </a:ext>
-              </a:extLst>
-            </p:cNvPr>
-            <p:cNvGrpSpPr/>
-            <p:nvPr/>
-          </p:nvGrpSpPr>
-          <p:grpSpPr>
-            <a:xfrm>
-              <a:off x="3621626" y="3523812"/>
-              <a:ext cx="629692" cy="949574"/>
-              <a:chOff x="3495552" y="3508212"/>
-              <a:chExt cx="629692" cy="949574"/>
-            </a:xfrm>
-          </p:grpSpPr>
-          <p:grpSp>
-            <p:nvGrpSpPr>
-              <p:cNvPr id="49" name="Group 48">
-                <a:extLst>
-                  <a:ext uri="{FF2B5EF4-FFF2-40B4-BE49-F238E27FC236}">
-                    <a16:creationId xmlns:a16="http://schemas.microsoft.com/office/drawing/2014/main" id="{1C0EDB94-FD9A-4CDF-8CF9-4A7BA51CB22A}"/>
-                  </a:ext>
-                </a:extLst>
-              </p:cNvPr>
-              <p:cNvGrpSpPr/>
-              <p:nvPr/>
-            </p:nvGrpSpPr>
-            <p:grpSpPr>
-              <a:xfrm>
-                <a:off x="3495552" y="3508212"/>
-                <a:ext cx="629692" cy="949574"/>
-                <a:chOff x="3957851" y="2183642"/>
-                <a:chExt cx="443552" cy="668875"/>
-              </a:xfrm>
-            </p:grpSpPr>
-            <p:sp>
-              <p:nvSpPr>
-                <p:cNvPr id="54" name="Rectangle: Rounded Corners 53">
-                  <a:extLst>
-                    <a:ext uri="{FF2B5EF4-FFF2-40B4-BE49-F238E27FC236}">
-                      <a16:creationId xmlns:a16="http://schemas.microsoft.com/office/drawing/2014/main" id="{0CF4464D-5372-4C84-8E9B-9AB0C44E1706}"/>
-                    </a:ext>
-                  </a:extLst>
-                </p:cNvPr>
-                <p:cNvSpPr/>
-                <p:nvPr/>
-              </p:nvSpPr>
-              <p:spPr>
-                <a:xfrm>
-                  <a:off x="3957851" y="2183642"/>
-                  <a:ext cx="443552" cy="300251"/>
-                </a:xfrm>
-                <a:prstGeom prst="roundRect">
-                  <a:avLst/>
-                </a:prstGeom>
-                <a:solidFill>
-                  <a:srgbClr val="FFC000"/>
-                </a:solidFill>
-                <a:ln w="28575">
-                  <a:solidFill>
-                    <a:schemeClr val="tx1"/>
-                  </a:solidFill>
-                </a:ln>
-              </p:spPr>
-              <p:style>
-                <a:lnRef idx="2">
-                  <a:schemeClr val="accent1">
-                    <a:shade val="50000"/>
-                  </a:schemeClr>
-                </a:lnRef>
-                <a:fillRef idx="1">
-                  <a:schemeClr val="accent1"/>
-                </a:fillRef>
-                <a:effectRef idx="0">
-                  <a:schemeClr val="accent1"/>
-                </a:effectRef>
-                <a:fontRef idx="minor">
-                  <a:schemeClr val="lt1"/>
-                </a:fontRef>
-              </p:style>
-              <p:txBody>
-                <a:bodyPr rtlCol="0" anchor="ctr"/>
-                <a:lstStyle/>
-                <a:p>
-                  <a:pPr algn="ctr"/>
-                  <a:endParaRPr lang="en-US" sz="3000"/>
-                </a:p>
-              </p:txBody>
-            </p:sp>
-            <p:sp>
-              <p:nvSpPr>
-                <p:cNvPr id="55" name="Rectangle: Rounded Corners 54">
-                  <a:extLst>
-                    <a:ext uri="{FF2B5EF4-FFF2-40B4-BE49-F238E27FC236}">
-                      <a16:creationId xmlns:a16="http://schemas.microsoft.com/office/drawing/2014/main" id="{5F465A5A-2A73-4F90-963C-B3F306010C5C}"/>
-                    </a:ext>
-                  </a:extLst>
-                </p:cNvPr>
-                <p:cNvSpPr/>
-                <p:nvPr/>
-              </p:nvSpPr>
-              <p:spPr>
-                <a:xfrm>
-                  <a:off x="3957851" y="2552266"/>
-                  <a:ext cx="443552" cy="300251"/>
-                </a:xfrm>
-                <a:prstGeom prst="roundRect">
-                  <a:avLst/>
-                </a:prstGeom>
-                <a:solidFill>
-                  <a:srgbClr val="FFC000"/>
-                </a:solidFill>
-                <a:ln w="28575">
-                  <a:solidFill>
-                    <a:schemeClr val="tx1"/>
-                  </a:solidFill>
-                </a:ln>
-              </p:spPr>
-              <p:style>
-                <a:lnRef idx="2">
-                  <a:schemeClr val="accent1">
-                    <a:shade val="50000"/>
-                  </a:schemeClr>
-                </a:lnRef>
-                <a:fillRef idx="1">
-                  <a:schemeClr val="accent1"/>
-                </a:fillRef>
-                <a:effectRef idx="0">
-                  <a:schemeClr val="accent1"/>
-                </a:effectRef>
-                <a:fontRef idx="minor">
-                  <a:schemeClr val="lt1"/>
-                </a:fontRef>
-              </p:style>
-              <p:txBody>
-                <a:bodyPr rtlCol="0" anchor="ctr"/>
-                <a:lstStyle/>
-                <a:p>
-                  <a:pPr algn="ctr"/>
-                  <a:endParaRPr lang="en-US" sz="3000" dirty="0"/>
-                </a:p>
-              </p:txBody>
-            </p:sp>
-          </p:grpSp>
-          <p:sp>
-            <p:nvSpPr>
-              <p:cNvPr id="52" name="Arrow: Right 51">
-                <a:extLst>
-                  <a:ext uri="{FF2B5EF4-FFF2-40B4-BE49-F238E27FC236}">
-                    <a16:creationId xmlns:a16="http://schemas.microsoft.com/office/drawing/2014/main" id="{311EF5E7-D221-499D-8BFA-3684FDF64548}"/>
-                  </a:ext>
-                </a:extLst>
-              </p:cNvPr>
-              <p:cNvSpPr/>
-              <p:nvPr/>
-            </p:nvSpPr>
-            <p:spPr>
-              <a:xfrm rot="5400000" flipH="1">
-                <a:off x="3662410" y="3609801"/>
-                <a:ext cx="304526" cy="218636"/>
-              </a:xfrm>
-              <a:prstGeom prst="rightArrow">
+              <a:prstGeom prst="roundRect">
                 <a:avLst/>
               </a:prstGeom>
               <a:solidFill>
-                <a:schemeClr val="bg1"/>
+                <a:srgbClr val="FFC000"/>
               </a:solidFill>
-              <a:ln>
+              <a:ln w="28575">
                 <a:solidFill>
                   <a:schemeClr val="tx1"/>
                 </a:solidFill>
@@ -5746,71 +5488,17 @@
               <a:lstStyle/>
               <a:p>
                 <a:pPr algn="ctr"/>
-                <a:endParaRPr lang="en-US"/>
-              </a:p>
-            </p:txBody>
-          </p:sp>
-          <p:sp>
-            <p:nvSpPr>
-              <p:cNvPr id="53" name="Arrow: Right 52">
-                <a:extLst>
-                  <a:ext uri="{FF2B5EF4-FFF2-40B4-BE49-F238E27FC236}">
-                    <a16:creationId xmlns:a16="http://schemas.microsoft.com/office/drawing/2014/main" id="{4ED00285-28D3-44D4-869D-00BDA001DE84}"/>
-                  </a:ext>
-                </a:extLst>
-              </p:cNvPr>
-              <p:cNvSpPr/>
-              <p:nvPr/>
-            </p:nvSpPr>
-            <p:spPr>
-              <a:xfrm rot="16200000" flipH="1" flipV="1">
-                <a:off x="3662410" y="4142194"/>
-                <a:ext cx="304526" cy="218636"/>
-              </a:xfrm>
-              <a:prstGeom prst="rightArrow">
-                <a:avLst/>
-              </a:prstGeom>
-              <a:solidFill>
-                <a:schemeClr val="bg1"/>
-              </a:solidFill>
-              <a:ln>
-                <a:solidFill>
-                  <a:schemeClr val="tx1"/>
-                </a:solidFill>
-              </a:ln>
-            </p:spPr>
-            <p:style>
-              <a:lnRef idx="2">
-                <a:schemeClr val="accent1">
-                  <a:shade val="50000"/>
-                </a:schemeClr>
-              </a:lnRef>
-              <a:fillRef idx="1">
-                <a:schemeClr val="accent1"/>
-              </a:fillRef>
-              <a:effectRef idx="0">
-                <a:schemeClr val="accent1"/>
-              </a:effectRef>
-              <a:fontRef idx="minor">
-                <a:schemeClr val="lt1"/>
-              </a:fontRef>
-            </p:style>
-            <p:txBody>
-              <a:bodyPr rtlCol="0" anchor="ctr"/>
-              <a:lstStyle/>
-              <a:p>
-                <a:pPr algn="ctr"/>
-                <a:endParaRPr lang="en-US"/>
+                <a:endParaRPr lang="en-US" sz="3000" dirty="0"/>
               </a:p>
             </p:txBody>
           </p:sp>
         </p:grpSp>
         <p:sp>
           <p:nvSpPr>
-            <p:cNvPr id="47" name="Arrow: Right 46">
+            <p:cNvPr id="52" name="Arrow: Right 51">
               <a:extLst>
                 <a:ext uri="{FF2B5EF4-FFF2-40B4-BE49-F238E27FC236}">
-                  <a16:creationId xmlns:a16="http://schemas.microsoft.com/office/drawing/2014/main" id="{0C63C7F4-42D7-4667-8672-23DDB76E9563}"/>
+                  <a16:creationId xmlns:a16="http://schemas.microsoft.com/office/drawing/2014/main" id="{311EF5E7-D221-499D-8BFA-3684FDF64548}"/>
                 </a:ext>
               </a:extLst>
             </p:cNvPr>
@@ -5818,23 +5506,20 @@
             <p:nvPr/>
           </p:nvSpPr>
           <p:spPr>
-            <a:xfrm>
-              <a:off x="1562152" y="3715947"/>
-              <a:ext cx="1019059" cy="565304"/>
+            <a:xfrm rot="5400000" flipH="1">
+              <a:off x="3662410" y="3609801"/>
+              <a:ext cx="304526" cy="218636"/>
             </a:xfrm>
             <a:prstGeom prst="rightArrow">
-              <a:avLst>
-                <a:gd name="adj1" fmla="val 43464"/>
-                <a:gd name="adj2" fmla="val 119660"/>
-              </a:avLst>
+              <a:avLst/>
             </a:prstGeom>
             <a:solidFill>
-              <a:schemeClr val="bg1">
-                <a:lumMod val="75000"/>
-              </a:schemeClr>
+              <a:schemeClr val="bg1"/>
             </a:solidFill>
             <a:ln>
-              <a:noFill/>
+              <a:solidFill>
+                <a:schemeClr val="tx1"/>
+              </a:solidFill>
             </a:ln>
           </p:spPr>
           <p:style>
@@ -5858,16 +5543,16 @@
             <a:lstStyle/>
             <a:p>
               <a:pPr algn="ctr"/>
-              <a:endParaRPr lang="en-US" dirty="0"/>
+              <a:endParaRPr lang="en-US"/>
             </a:p>
           </p:txBody>
         </p:sp>
         <p:sp>
           <p:nvSpPr>
-            <p:cNvPr id="48" name="Arrow: Right 47">
+            <p:cNvPr id="53" name="Arrow: Right 52">
               <a:extLst>
                 <a:ext uri="{FF2B5EF4-FFF2-40B4-BE49-F238E27FC236}">
-                  <a16:creationId xmlns:a16="http://schemas.microsoft.com/office/drawing/2014/main" id="{4D18AB2C-B66A-4FCD-AE2A-7B341732F69B}"/>
+                  <a16:creationId xmlns:a16="http://schemas.microsoft.com/office/drawing/2014/main" id="{4ED00285-28D3-44D4-869D-00BDA001DE84}"/>
                 </a:ext>
               </a:extLst>
             </p:cNvPr>
@@ -5875,23 +5560,20 @@
             <p:nvPr/>
           </p:nvSpPr>
           <p:spPr>
-            <a:xfrm>
-              <a:off x="5291740" y="3715947"/>
-              <a:ext cx="1019059" cy="565304"/>
+            <a:xfrm rot="16200000" flipH="1" flipV="1">
+              <a:off x="3662410" y="4142194"/>
+              <a:ext cx="304526" cy="218636"/>
             </a:xfrm>
             <a:prstGeom prst="rightArrow">
-              <a:avLst>
-                <a:gd name="adj1" fmla="val 43464"/>
-                <a:gd name="adj2" fmla="val 119660"/>
-              </a:avLst>
+              <a:avLst/>
             </a:prstGeom>
             <a:solidFill>
-              <a:schemeClr val="bg1">
-                <a:lumMod val="75000"/>
-              </a:schemeClr>
+              <a:schemeClr val="bg1"/>
             </a:solidFill>
             <a:ln>
-              <a:noFill/>
+              <a:solidFill>
+                <a:schemeClr val="tx1"/>
+              </a:solidFill>
             </a:ln>
           </p:spPr>
           <p:style>
@@ -5915,7 +5597,456 @@
             <a:lstStyle/>
             <a:p>
               <a:pPr algn="ctr"/>
-              <a:endParaRPr lang="en-US" dirty="0"/>
+              <a:endParaRPr lang="en-US"/>
+            </a:p>
+          </p:txBody>
+        </p:sp>
+      </p:grpSp>
+      <p:sp>
+        <p:nvSpPr>
+          <p:cNvPr id="47" name="Arrow: Right 46">
+            <a:extLst>
+              <a:ext uri="{FF2B5EF4-FFF2-40B4-BE49-F238E27FC236}">
+                <a16:creationId xmlns:a16="http://schemas.microsoft.com/office/drawing/2014/main" id="{0C63C7F4-42D7-4667-8672-23DDB76E9563}"/>
+              </a:ext>
+            </a:extLst>
+          </p:cNvPr>
+          <p:cNvSpPr/>
+          <p:nvPr/>
+        </p:nvSpPr>
+        <p:spPr>
+          <a:xfrm>
+            <a:off x="1545012" y="5288071"/>
+            <a:ext cx="1019059" cy="565304"/>
+          </a:xfrm>
+          <a:prstGeom prst="rightArrow">
+            <a:avLst>
+              <a:gd name="adj1" fmla="val 43464"/>
+              <a:gd name="adj2" fmla="val 119660"/>
+            </a:avLst>
+          </a:prstGeom>
+          <a:solidFill>
+            <a:schemeClr val="bg1">
+              <a:lumMod val="75000"/>
+            </a:schemeClr>
+          </a:solidFill>
+          <a:ln>
+            <a:noFill/>
+          </a:ln>
+        </p:spPr>
+        <p:style>
+          <a:lnRef idx="2">
+            <a:schemeClr val="accent1">
+              <a:shade val="50000"/>
+            </a:schemeClr>
+          </a:lnRef>
+          <a:fillRef idx="1">
+            <a:schemeClr val="accent1"/>
+          </a:fillRef>
+          <a:effectRef idx="0">
+            <a:schemeClr val="accent1"/>
+          </a:effectRef>
+          <a:fontRef idx="minor">
+            <a:schemeClr val="lt1"/>
+          </a:fontRef>
+        </p:style>
+        <p:txBody>
+          <a:bodyPr rtlCol="0" anchor="ctr"/>
+          <a:lstStyle/>
+          <a:p>
+            <a:pPr algn="ctr"/>
+            <a:endParaRPr lang="en-US" dirty="0"/>
+          </a:p>
+        </p:txBody>
+      </p:sp>
+      <p:sp>
+        <p:nvSpPr>
+          <p:cNvPr id="48" name="Arrow: Right 47">
+            <a:extLst>
+              <a:ext uri="{FF2B5EF4-FFF2-40B4-BE49-F238E27FC236}">
+                <a16:creationId xmlns:a16="http://schemas.microsoft.com/office/drawing/2014/main" id="{4D18AB2C-B66A-4FCD-AE2A-7B341732F69B}"/>
+              </a:ext>
+            </a:extLst>
+          </p:cNvPr>
+          <p:cNvSpPr/>
+          <p:nvPr/>
+        </p:nvSpPr>
+        <p:spPr>
+          <a:xfrm>
+            <a:off x="5894394" y="5286371"/>
+            <a:ext cx="1019059" cy="565304"/>
+          </a:xfrm>
+          <a:prstGeom prst="rightArrow">
+            <a:avLst>
+              <a:gd name="adj1" fmla="val 43464"/>
+              <a:gd name="adj2" fmla="val 119660"/>
+            </a:avLst>
+          </a:prstGeom>
+          <a:solidFill>
+            <a:schemeClr val="bg1">
+              <a:lumMod val="75000"/>
+            </a:schemeClr>
+          </a:solidFill>
+          <a:ln>
+            <a:noFill/>
+          </a:ln>
+        </p:spPr>
+        <p:style>
+          <a:lnRef idx="2">
+            <a:schemeClr val="accent1">
+              <a:shade val="50000"/>
+            </a:schemeClr>
+          </a:lnRef>
+          <a:fillRef idx="1">
+            <a:schemeClr val="accent1"/>
+          </a:fillRef>
+          <a:effectRef idx="0">
+            <a:schemeClr val="accent1"/>
+          </a:effectRef>
+          <a:fontRef idx="minor">
+            <a:schemeClr val="lt1"/>
+          </a:fontRef>
+        </p:style>
+        <p:txBody>
+          <a:bodyPr rtlCol="0" anchor="ctr"/>
+          <a:lstStyle/>
+          <a:p>
+            <a:pPr algn="ctr"/>
+            <a:endParaRPr lang="en-US" dirty="0"/>
+          </a:p>
+        </p:txBody>
+      </p:sp>
+      <p:grpSp>
+        <p:nvGrpSpPr>
+          <p:cNvPr id="11" name="Group 10">
+            <a:extLst>
+              <a:ext uri="{FF2B5EF4-FFF2-40B4-BE49-F238E27FC236}">
+                <a16:creationId xmlns:a16="http://schemas.microsoft.com/office/drawing/2014/main" id="{6B21DD9B-7D7D-40CD-A46C-DA4AE5BB1E93}"/>
+              </a:ext>
+            </a:extLst>
+          </p:cNvPr>
+          <p:cNvGrpSpPr/>
+          <p:nvPr/>
+        </p:nvGrpSpPr>
+        <p:grpSpPr>
+          <a:xfrm>
+            <a:off x="6597741" y="1810006"/>
+            <a:ext cx="2117469" cy="649359"/>
+            <a:chOff x="6778893" y="1649483"/>
+            <a:chExt cx="2117469" cy="649359"/>
+          </a:xfrm>
+        </p:grpSpPr>
+        <p:sp>
+          <p:nvSpPr>
+            <p:cNvPr id="50" name="Flowchart: Alternate Process 49">
+              <a:extLst>
+                <a:ext uri="{FF2B5EF4-FFF2-40B4-BE49-F238E27FC236}">
+                  <a16:creationId xmlns:a16="http://schemas.microsoft.com/office/drawing/2014/main" id="{86312510-0941-48A2-80F5-3E6FB3C47310}"/>
+                </a:ext>
+              </a:extLst>
+            </p:cNvPr>
+            <p:cNvSpPr/>
+            <p:nvPr/>
+          </p:nvSpPr>
+          <p:spPr>
+            <a:xfrm>
+              <a:off x="6778893" y="1649485"/>
+              <a:ext cx="705823" cy="649357"/>
+            </a:xfrm>
+            <a:prstGeom prst="flowChartAlternateProcess">
+              <a:avLst/>
+            </a:prstGeom>
+            <a:solidFill>
+              <a:schemeClr val="bg1">
+                <a:lumMod val="50000"/>
+              </a:schemeClr>
+            </a:solidFill>
+            <a:ln>
+              <a:noFill/>
+            </a:ln>
+          </p:spPr>
+          <p:style>
+            <a:lnRef idx="2">
+              <a:schemeClr val="accent1">
+                <a:shade val="50000"/>
+              </a:schemeClr>
+            </a:lnRef>
+            <a:fillRef idx="1">
+              <a:schemeClr val="accent1"/>
+            </a:fillRef>
+            <a:effectRef idx="0">
+              <a:schemeClr val="accent1"/>
+            </a:effectRef>
+            <a:fontRef idx="minor">
+              <a:schemeClr val="lt1"/>
+            </a:fontRef>
+          </p:style>
+          <p:txBody>
+            <a:bodyPr rtlCol="0" anchor="ctr"/>
+            <a:lstStyle/>
+            <a:p>
+              <a:pPr algn="ctr"/>
+              <a:endParaRPr lang="en-US"/>
+            </a:p>
+          </p:txBody>
+        </p:sp>
+        <p:sp>
+          <p:nvSpPr>
+            <p:cNvPr id="51" name="Flowchart: Alternate Process 50">
+              <a:extLst>
+                <a:ext uri="{FF2B5EF4-FFF2-40B4-BE49-F238E27FC236}">
+                  <a16:creationId xmlns:a16="http://schemas.microsoft.com/office/drawing/2014/main" id="{F759A5AF-0402-4609-A32A-8EE3CEB6AB81}"/>
+                </a:ext>
+              </a:extLst>
+            </p:cNvPr>
+            <p:cNvSpPr/>
+            <p:nvPr/>
+          </p:nvSpPr>
+          <p:spPr>
+            <a:xfrm>
+              <a:off x="7484716" y="1649484"/>
+              <a:ext cx="705823" cy="649357"/>
+            </a:xfrm>
+            <a:prstGeom prst="flowChartAlternateProcess">
+              <a:avLst/>
+            </a:prstGeom>
+            <a:solidFill>
+              <a:schemeClr val="bg1">
+                <a:lumMod val="50000"/>
+              </a:schemeClr>
+            </a:solidFill>
+            <a:ln>
+              <a:noFill/>
+            </a:ln>
+          </p:spPr>
+          <p:style>
+            <a:lnRef idx="2">
+              <a:schemeClr val="accent1">
+                <a:shade val="50000"/>
+              </a:schemeClr>
+            </a:lnRef>
+            <a:fillRef idx="1">
+              <a:schemeClr val="accent1"/>
+            </a:fillRef>
+            <a:effectRef idx="0">
+              <a:schemeClr val="accent1"/>
+            </a:effectRef>
+            <a:fontRef idx="minor">
+              <a:schemeClr val="lt1"/>
+            </a:fontRef>
+          </p:style>
+          <p:txBody>
+            <a:bodyPr rtlCol="0" anchor="ctr"/>
+            <a:lstStyle/>
+            <a:p>
+              <a:pPr algn="ctr"/>
+              <a:endParaRPr lang="en-US"/>
+            </a:p>
+          </p:txBody>
+        </p:sp>
+        <p:sp>
+          <p:nvSpPr>
+            <p:cNvPr id="56" name="Flowchart: Alternate Process 55">
+              <a:extLst>
+                <a:ext uri="{FF2B5EF4-FFF2-40B4-BE49-F238E27FC236}">
+                  <a16:creationId xmlns:a16="http://schemas.microsoft.com/office/drawing/2014/main" id="{BE65C610-13F1-4B4B-8C23-E8B45A93731B}"/>
+                </a:ext>
+              </a:extLst>
+            </p:cNvPr>
+            <p:cNvSpPr/>
+            <p:nvPr/>
+          </p:nvSpPr>
+          <p:spPr>
+            <a:xfrm>
+              <a:off x="8190539" y="1649483"/>
+              <a:ext cx="705823" cy="649357"/>
+            </a:xfrm>
+            <a:prstGeom prst="flowChartAlternateProcess">
+              <a:avLst/>
+            </a:prstGeom>
+            <a:solidFill>
+              <a:schemeClr val="bg1">
+                <a:lumMod val="50000"/>
+              </a:schemeClr>
+            </a:solidFill>
+            <a:ln>
+              <a:noFill/>
+            </a:ln>
+          </p:spPr>
+          <p:style>
+            <a:lnRef idx="2">
+              <a:schemeClr val="accent1">
+                <a:shade val="50000"/>
+              </a:schemeClr>
+            </a:lnRef>
+            <a:fillRef idx="1">
+              <a:schemeClr val="accent1"/>
+            </a:fillRef>
+            <a:effectRef idx="0">
+              <a:schemeClr val="accent1"/>
+            </a:effectRef>
+            <a:fontRef idx="minor">
+              <a:schemeClr val="lt1"/>
+            </a:fontRef>
+          </p:style>
+          <p:txBody>
+            <a:bodyPr rtlCol="0" anchor="ctr"/>
+            <a:lstStyle/>
+            <a:p>
+              <a:pPr algn="ctr"/>
+              <a:endParaRPr lang="en-US"/>
+            </a:p>
+          </p:txBody>
+        </p:sp>
+      </p:grpSp>
+      <p:grpSp>
+        <p:nvGrpSpPr>
+          <p:cNvPr id="69" name="Group 68">
+            <a:extLst>
+              <a:ext uri="{FF2B5EF4-FFF2-40B4-BE49-F238E27FC236}">
+                <a16:creationId xmlns:a16="http://schemas.microsoft.com/office/drawing/2014/main" id="{0932835B-A50F-4251-BC54-F5A8348D36F1}"/>
+              </a:ext>
+            </a:extLst>
+          </p:cNvPr>
+          <p:cNvGrpSpPr/>
+          <p:nvPr/>
+        </p:nvGrpSpPr>
+        <p:grpSpPr>
+          <a:xfrm>
+            <a:off x="5182101" y="3354940"/>
+            <a:ext cx="443552" cy="558990"/>
+            <a:chOff x="1577753" y="3690492"/>
+            <a:chExt cx="443552" cy="558990"/>
+          </a:xfrm>
+        </p:grpSpPr>
+        <p:sp>
+          <p:nvSpPr>
+            <p:cNvPr id="70" name="Rectangle: Rounded Corners 69">
+              <a:extLst>
+                <a:ext uri="{FF2B5EF4-FFF2-40B4-BE49-F238E27FC236}">
+                  <a16:creationId xmlns:a16="http://schemas.microsoft.com/office/drawing/2014/main" id="{C2629192-7CA0-4490-992D-E8DB9B31DBB4}"/>
+                </a:ext>
+              </a:extLst>
+            </p:cNvPr>
+            <p:cNvSpPr/>
+            <p:nvPr/>
+          </p:nvSpPr>
+          <p:spPr>
+            <a:xfrm>
+              <a:off x="1577753" y="3690492"/>
+              <a:ext cx="443552" cy="553998"/>
+            </a:xfrm>
+            <a:prstGeom prst="roundRect">
+              <a:avLst/>
+            </a:prstGeom>
+            <a:solidFill>
+              <a:srgbClr val="FFC000"/>
+            </a:solidFill>
+            <a:ln w="38100">
+              <a:solidFill>
+                <a:schemeClr val="tx1"/>
+              </a:solidFill>
+            </a:ln>
+          </p:spPr>
+          <p:style>
+            <a:lnRef idx="2">
+              <a:schemeClr val="accent1">
+                <a:shade val="50000"/>
+              </a:schemeClr>
+            </a:lnRef>
+            <a:fillRef idx="1">
+              <a:schemeClr val="accent1"/>
+            </a:fillRef>
+            <a:effectRef idx="0">
+              <a:schemeClr val="accent1"/>
+            </a:effectRef>
+            <a:fontRef idx="minor">
+              <a:schemeClr val="lt1"/>
+            </a:fontRef>
+          </p:style>
+          <p:txBody>
+            <a:bodyPr rtlCol="0" anchor="ctr"/>
+            <a:lstStyle/>
+            <a:p>
+              <a:pPr algn="ctr"/>
+              <a:endParaRPr lang="en-US"/>
+            </a:p>
+          </p:txBody>
+        </p:sp>
+        <p:sp>
+          <p:nvSpPr>
+            <p:cNvPr id="71" name="Rectangle 70">
+              <a:extLst>
+                <a:ext uri="{FF2B5EF4-FFF2-40B4-BE49-F238E27FC236}">
+                  <a16:creationId xmlns:a16="http://schemas.microsoft.com/office/drawing/2014/main" id="{267B284F-8A3E-4753-8937-EBFB9CAE2B66}"/>
+                </a:ext>
+              </a:extLst>
+            </p:cNvPr>
+            <p:cNvSpPr/>
+            <p:nvPr/>
+          </p:nvSpPr>
+          <p:spPr>
+            <a:xfrm>
+              <a:off x="1590975" y="3695484"/>
+              <a:ext cx="407484" cy="553998"/>
+            </a:xfrm>
+            <a:prstGeom prst="rect">
+              <a:avLst/>
+            </a:prstGeom>
+            <a:noFill/>
+          </p:spPr>
+          <p:txBody>
+            <a:bodyPr wrap="none" lIns="91440" tIns="45720" rIns="91440" bIns="45720">
+              <a:spAutoFit/>
+            </a:bodyPr>
+            <a:lstStyle/>
+            <a:p>
+              <a:pPr algn="ctr"/>
+              <a:r>
+                <a:rPr lang="en-US" sz="3000" b="1" spc="50" dirty="0">
+                  <a:ln w="9525" cmpd="sng">
+                    <a:solidFill>
+                      <a:schemeClr val="tx1"/>
+                    </a:solidFill>
+                    <a:prstDash val="solid"/>
+                  </a:ln>
+                  <a:solidFill>
+                    <a:srgbClr val="70AD47">
+                      <a:tint val="1000"/>
+                    </a:srgbClr>
+                  </a:solidFill>
+                  <a:effectLst>
+                    <a:glow rad="38100">
+                      <a:schemeClr val="accent1">
+                        <a:alpha val="40000"/>
+                      </a:schemeClr>
+                    </a:glow>
+                  </a:effectLst>
+                  <a:latin typeface="Abadi" panose="020B0604020104020204" pitchFamily="34" charset="0"/>
+                </a:rPr>
+                <a:t>R</a:t>
+              </a:r>
+              <a:endParaRPr lang="en-US" sz="3000" b="1" cap="none" spc="50" dirty="0">
+                <a:ln w="9525" cmpd="sng">
+                  <a:solidFill>
+                    <a:schemeClr val="tx1"/>
+                  </a:solidFill>
+                  <a:prstDash val="solid"/>
+                </a:ln>
+                <a:solidFill>
+                  <a:srgbClr val="70AD47">
+                    <a:tint val="1000"/>
+                  </a:srgbClr>
+                </a:solidFill>
+                <a:effectLst>
+                  <a:glow rad="38100">
+                    <a:schemeClr val="accent1">
+                      <a:alpha val="40000"/>
+                    </a:schemeClr>
+                  </a:glow>
+                </a:effectLst>
+                <a:latin typeface="Abadi" panose="020B0604020104020204" pitchFamily="34" charset="0"/>
+              </a:endParaRPr>
             </a:p>
           </p:txBody>
         </p:sp>

</xml_diff>